<commit_message>
R notebook + PPT
R Notebook 
- Script and Outputs - Need to fix something in the R script (might be an issue on my end) so that inline outputs can show up; there is an error message appearing around (in this notebook) line 187 - it is line 99 in the original
- Written Summary -  Need to insert Graph 4 (see above issue)
- PPT links to PPTX file in this GitHub repository
</commit_message>
<xml_diff>
--- a/Kickstart your way to success.pptx
+++ b/Kickstart your way to success.pptx
@@ -5,13 +5,22 @@
     <p:sldMasterId id="2147483648" r:id="rId1"/>
   </p:sldMasterIdLst>
   <p:notesMasterIdLst>
-    <p:notesMasterId r:id="rId6"/>
+    <p:notesMasterId r:id="rId15"/>
   </p:notesMasterIdLst>
   <p:sldIdLst>
     <p:sldId id="256" r:id="rId2"/>
     <p:sldId id="257" r:id="rId3"/>
     <p:sldId id="258" r:id="rId4"/>
     <p:sldId id="259" r:id="rId5"/>
+    <p:sldId id="267" r:id="rId6"/>
+    <p:sldId id="260" r:id="rId7"/>
+    <p:sldId id="261" r:id="rId8"/>
+    <p:sldId id="262" r:id="rId9"/>
+    <p:sldId id="263" r:id="rId10"/>
+    <p:sldId id="264" r:id="rId11"/>
+    <p:sldId id="268" r:id="rId12"/>
+    <p:sldId id="266" r:id="rId13"/>
+    <p:sldId id="265" r:id="rId14"/>
   </p:sldIdLst>
   <p:sldSz cx="12192000" cy="6858000"/>
   <p:notesSz cx="6858000" cy="9144000"/>
@@ -118,6 +127,987 @@
 </p:presentation>
 </file>
 
+<file path=ppt/commentAuthors.xml><?xml version="1.0" encoding="utf-8"?>
+<p:cmAuthorLst xmlns:a="http://schemas.openxmlformats.org/drawingml/2006/main" xmlns:r="http://schemas.openxmlformats.org/officeDocument/2006/relationships" xmlns:p="http://schemas.openxmlformats.org/presentationml/2006/main">
+  <p:cmAuthor id="1" name="Janice" initials="J" lastIdx="1" clrIdx="0">
+    <p:extLst>
+      <p:ext uri="{19B8F6BF-5375-455C-9EA6-DF929625EA0E}">
+        <p15:presenceInfo xmlns:p15="http://schemas.microsoft.com/office/powerpoint/2012/main" userId="Janice" providerId="None"/>
+      </p:ext>
+    </p:extLst>
+  </p:cmAuthor>
+</p:cmAuthorLst>
+</file>
+
+<file path=ppt/charts/chart1.xml><?xml version="1.0" encoding="utf-8"?>
+<c:chartSpace xmlns:c="http://schemas.openxmlformats.org/drawingml/2006/chart" xmlns:a="http://schemas.openxmlformats.org/drawingml/2006/main" xmlns:r="http://schemas.openxmlformats.org/officeDocument/2006/relationships">
+  <c:date1904 val="0"/>
+  <c:lang val="en-US"/>
+  <c:roundedCorners val="0"/>
+  <mc:AlternateContent xmlns:mc="http://schemas.openxmlformats.org/markup-compatibility/2006">
+    <mc:Choice xmlns:c14="http://schemas.microsoft.com/office/drawing/2007/8/2/chart" Requires="c14">
+      <c14:style val="102"/>
+    </mc:Choice>
+    <mc:Fallback>
+      <c:style val="2"/>
+    </mc:Fallback>
+  </mc:AlternateContent>
+  <c:chart>
+    <c:title>
+      <c:tx>
+        <c:rich>
+          <a:bodyPr rot="0" spcFirstLastPara="1" vertOverflow="ellipsis" vert="horz" wrap="square" anchor="ctr" anchorCtr="1"/>
+          <a:lstStyle/>
+          <a:p>
+            <a:pPr>
+              <a:defRPr sz="1862" b="0" i="0" u="none" strike="noStrike" kern="1200" spc="0" baseline="0">
+                <a:solidFill>
+                  <a:schemeClr val="tx1">
+                    <a:lumMod val="65000"/>
+                    <a:lumOff val="35000"/>
+                  </a:schemeClr>
+                </a:solidFill>
+                <a:latin typeface="+mn-lt"/>
+                <a:ea typeface="+mn-ea"/>
+                <a:cs typeface="+mn-cs"/>
+              </a:defRPr>
+            </a:pPr>
+            <a:r>
+              <a:rPr lang="en-US" dirty="0" smtClean="0"/>
+              <a:t>Success Rate</a:t>
+            </a:r>
+            <a:endParaRPr lang="en-US" dirty="0"/>
+          </a:p>
+        </c:rich>
+      </c:tx>
+      <c:layout/>
+      <c:overlay val="0"/>
+      <c:spPr>
+        <a:noFill/>
+        <a:ln>
+          <a:noFill/>
+        </a:ln>
+        <a:effectLst/>
+      </c:spPr>
+      <c:txPr>
+        <a:bodyPr rot="0" spcFirstLastPara="1" vertOverflow="ellipsis" vert="horz" wrap="square" anchor="ctr" anchorCtr="1"/>
+        <a:lstStyle/>
+        <a:p>
+          <a:pPr>
+            <a:defRPr sz="1862" b="0" i="0" u="none" strike="noStrike" kern="1200" spc="0" baseline="0">
+              <a:solidFill>
+                <a:schemeClr val="tx1">
+                  <a:lumMod val="65000"/>
+                  <a:lumOff val="35000"/>
+                </a:schemeClr>
+              </a:solidFill>
+              <a:latin typeface="+mn-lt"/>
+              <a:ea typeface="+mn-ea"/>
+              <a:cs typeface="+mn-cs"/>
+            </a:defRPr>
+          </a:pPr>
+          <a:endParaRPr lang="en-US"/>
+        </a:p>
+      </c:txPr>
+    </c:title>
+    <c:autoTitleDeleted val="0"/>
+    <c:plotArea>
+      <c:layout/>
+      <c:barChart>
+        <c:barDir val="bar"/>
+        <c:grouping val="percentStacked"/>
+        <c:varyColors val="0"/>
+        <c:ser>
+          <c:idx val="0"/>
+          <c:order val="0"/>
+          <c:tx>
+            <c:strRef>
+              <c:f>Sheet1!$B$1</c:f>
+              <c:strCache>
+                <c:ptCount val="1"/>
+                <c:pt idx="0">
+                  <c:v>Success</c:v>
+                </c:pt>
+              </c:strCache>
+            </c:strRef>
+          </c:tx>
+          <c:spPr>
+            <a:solidFill>
+              <a:schemeClr val="accent1"/>
+            </a:solidFill>
+            <a:ln>
+              <a:noFill/>
+            </a:ln>
+            <a:effectLst/>
+          </c:spPr>
+          <c:invertIfNegative val="0"/>
+          <c:dPt>
+            <c:idx val="0"/>
+            <c:invertIfNegative val="0"/>
+            <c:bubble3D val="0"/>
+            <c:spPr>
+              <a:solidFill>
+                <a:srgbClr val="FFFF00"/>
+              </a:solidFill>
+              <a:ln w="0">
+                <a:solidFill>
+                  <a:srgbClr val="FFFF00"/>
+                </a:solidFill>
+              </a:ln>
+              <a:effectLst/>
+            </c:spPr>
+          </c:dPt>
+          <c:cat>
+            <c:strRef>
+              <c:f>Sheet1!$A$2:$A$3</c:f>
+              <c:strCache>
+                <c:ptCount val="2"/>
+                <c:pt idx="0">
+                  <c:v>Minus Outliers</c:v>
+                </c:pt>
+                <c:pt idx="1">
+                  <c:v>All Campaigns</c:v>
+                </c:pt>
+              </c:strCache>
+            </c:strRef>
+          </c:cat>
+          <c:val>
+            <c:numRef>
+              <c:f>Sheet1!$B$2:$B$3</c:f>
+              <c:numCache>
+                <c:formatCode>General</c:formatCode>
+                <c:ptCount val="2"/>
+                <c:pt idx="0">
+                  <c:v>67</c:v>
+                </c:pt>
+                <c:pt idx="1">
+                  <c:v>59</c:v>
+                </c:pt>
+              </c:numCache>
+            </c:numRef>
+          </c:val>
+        </c:ser>
+        <c:ser>
+          <c:idx val="1"/>
+          <c:order val="1"/>
+          <c:tx>
+            <c:strRef>
+              <c:f>Sheet1!$C$1</c:f>
+              <c:strCache>
+                <c:ptCount val="1"/>
+                <c:pt idx="0">
+                  <c:v>Failure</c:v>
+                </c:pt>
+              </c:strCache>
+            </c:strRef>
+          </c:tx>
+          <c:spPr>
+            <a:solidFill>
+              <a:schemeClr val="accent6">
+                <a:lumMod val="20000"/>
+                <a:lumOff val="80000"/>
+              </a:schemeClr>
+            </a:solidFill>
+            <a:ln>
+              <a:noFill/>
+            </a:ln>
+            <a:effectLst/>
+          </c:spPr>
+          <c:invertIfNegative val="0"/>
+          <c:dPt>
+            <c:idx val="0"/>
+            <c:invertIfNegative val="0"/>
+            <c:bubble3D val="0"/>
+            <c:spPr>
+              <a:solidFill>
+                <a:schemeClr val="tx1">
+                  <a:lumMod val="85000"/>
+                </a:schemeClr>
+              </a:solidFill>
+              <a:ln>
+                <a:noFill/>
+              </a:ln>
+              <a:effectLst/>
+            </c:spPr>
+          </c:dPt>
+          <c:dPt>
+            <c:idx val="1"/>
+            <c:invertIfNegative val="0"/>
+            <c:bubble3D val="0"/>
+            <c:spPr>
+              <a:solidFill>
+                <a:schemeClr val="tx1">
+                  <a:lumMod val="85000"/>
+                </a:schemeClr>
+              </a:solidFill>
+              <a:ln>
+                <a:noFill/>
+              </a:ln>
+              <a:effectLst/>
+            </c:spPr>
+          </c:dPt>
+          <c:cat>
+            <c:strRef>
+              <c:f>Sheet1!$A$2:$A$3</c:f>
+              <c:strCache>
+                <c:ptCount val="2"/>
+                <c:pt idx="0">
+                  <c:v>Minus Outliers</c:v>
+                </c:pt>
+                <c:pt idx="1">
+                  <c:v>All Campaigns</c:v>
+                </c:pt>
+              </c:strCache>
+            </c:strRef>
+          </c:cat>
+          <c:val>
+            <c:numRef>
+              <c:f>Sheet1!$C$2:$C$3</c:f>
+              <c:numCache>
+                <c:formatCode>General</c:formatCode>
+                <c:ptCount val="2"/>
+                <c:pt idx="0">
+                  <c:v>33</c:v>
+                </c:pt>
+                <c:pt idx="1">
+                  <c:v>41</c:v>
+                </c:pt>
+              </c:numCache>
+            </c:numRef>
+          </c:val>
+        </c:ser>
+        <c:dLbls>
+          <c:showLegendKey val="0"/>
+          <c:showVal val="0"/>
+          <c:showCatName val="0"/>
+          <c:showSerName val="0"/>
+          <c:showPercent val="0"/>
+          <c:showBubbleSize val="0"/>
+        </c:dLbls>
+        <c:gapWidth val="150"/>
+        <c:overlap val="100"/>
+        <c:axId val="-1661968496"/>
+        <c:axId val="-1661969584"/>
+      </c:barChart>
+      <c:catAx>
+        <c:axId val="-1661968496"/>
+        <c:scaling>
+          <c:orientation val="minMax"/>
+        </c:scaling>
+        <c:delete val="0"/>
+        <c:axPos val="l"/>
+        <c:numFmt formatCode="General" sourceLinked="1"/>
+        <c:majorTickMark val="none"/>
+        <c:minorTickMark val="none"/>
+        <c:tickLblPos val="nextTo"/>
+        <c:spPr>
+          <a:noFill/>
+          <a:ln w="9525" cap="flat" cmpd="sng" algn="ctr">
+            <a:solidFill>
+              <a:schemeClr val="tx1">
+                <a:lumMod val="15000"/>
+                <a:lumOff val="85000"/>
+              </a:schemeClr>
+            </a:solidFill>
+            <a:round/>
+          </a:ln>
+          <a:effectLst/>
+        </c:spPr>
+        <c:txPr>
+          <a:bodyPr rot="-60000000" spcFirstLastPara="1" vertOverflow="ellipsis" vert="horz" wrap="square" anchor="ctr" anchorCtr="1"/>
+          <a:lstStyle/>
+          <a:p>
+            <a:pPr>
+              <a:defRPr sz="1197" b="0" i="0" u="none" strike="noStrike" kern="1200" baseline="0">
+                <a:solidFill>
+                  <a:schemeClr val="tx1">
+                    <a:lumMod val="65000"/>
+                    <a:lumOff val="35000"/>
+                  </a:schemeClr>
+                </a:solidFill>
+                <a:latin typeface="+mn-lt"/>
+                <a:ea typeface="+mn-ea"/>
+                <a:cs typeface="+mn-cs"/>
+              </a:defRPr>
+            </a:pPr>
+            <a:endParaRPr lang="en-US"/>
+          </a:p>
+        </c:txPr>
+        <c:crossAx val="-1661969584"/>
+        <c:crosses val="autoZero"/>
+        <c:auto val="1"/>
+        <c:lblAlgn val="ctr"/>
+        <c:lblOffset val="100"/>
+        <c:noMultiLvlLbl val="0"/>
+      </c:catAx>
+      <c:valAx>
+        <c:axId val="-1661969584"/>
+        <c:scaling>
+          <c:orientation val="minMax"/>
+        </c:scaling>
+        <c:delete val="0"/>
+        <c:axPos val="b"/>
+        <c:majorGridlines>
+          <c:spPr>
+            <a:ln w="9525" cap="flat" cmpd="sng" algn="ctr">
+              <a:solidFill>
+                <a:schemeClr val="tx1">
+                  <a:lumMod val="15000"/>
+                  <a:lumOff val="85000"/>
+                </a:schemeClr>
+              </a:solidFill>
+              <a:round/>
+            </a:ln>
+            <a:effectLst/>
+          </c:spPr>
+        </c:majorGridlines>
+        <c:numFmt formatCode="0%" sourceLinked="1"/>
+        <c:majorTickMark val="none"/>
+        <c:minorTickMark val="none"/>
+        <c:tickLblPos val="nextTo"/>
+        <c:spPr>
+          <a:noFill/>
+          <a:ln>
+            <a:noFill/>
+          </a:ln>
+          <a:effectLst/>
+        </c:spPr>
+        <c:txPr>
+          <a:bodyPr rot="-60000000" spcFirstLastPara="1" vertOverflow="ellipsis" vert="horz" wrap="square" anchor="ctr" anchorCtr="1"/>
+          <a:lstStyle/>
+          <a:p>
+            <a:pPr>
+              <a:defRPr sz="1197" b="0" i="0" u="none" strike="noStrike" kern="1200" baseline="0">
+                <a:solidFill>
+                  <a:schemeClr val="tx1">
+                    <a:lumMod val="65000"/>
+                    <a:lumOff val="35000"/>
+                  </a:schemeClr>
+                </a:solidFill>
+                <a:latin typeface="+mn-lt"/>
+                <a:ea typeface="+mn-ea"/>
+                <a:cs typeface="+mn-cs"/>
+              </a:defRPr>
+            </a:pPr>
+            <a:endParaRPr lang="en-US"/>
+          </a:p>
+        </c:txPr>
+        <c:crossAx val="-1661968496"/>
+        <c:crosses val="autoZero"/>
+        <c:crossBetween val="between"/>
+      </c:valAx>
+      <c:spPr>
+        <a:noFill/>
+        <a:ln>
+          <a:noFill/>
+        </a:ln>
+        <a:effectLst/>
+      </c:spPr>
+    </c:plotArea>
+    <c:legend>
+      <c:legendPos val="b"/>
+      <c:layout/>
+      <c:overlay val="0"/>
+      <c:spPr>
+        <a:noFill/>
+        <a:ln>
+          <a:noFill/>
+        </a:ln>
+        <a:effectLst/>
+      </c:spPr>
+      <c:txPr>
+        <a:bodyPr rot="0" spcFirstLastPara="1" vertOverflow="ellipsis" vert="horz" wrap="square" anchor="ctr" anchorCtr="1"/>
+        <a:lstStyle/>
+        <a:p>
+          <a:pPr>
+            <a:defRPr sz="1197" b="0" i="0" u="none" strike="noStrike" kern="1200" baseline="0">
+              <a:solidFill>
+                <a:schemeClr val="tx1">
+                  <a:lumMod val="65000"/>
+                  <a:lumOff val="35000"/>
+                </a:schemeClr>
+              </a:solidFill>
+              <a:latin typeface="+mn-lt"/>
+              <a:ea typeface="+mn-ea"/>
+              <a:cs typeface="+mn-cs"/>
+            </a:defRPr>
+          </a:pPr>
+          <a:endParaRPr lang="en-US"/>
+        </a:p>
+      </c:txPr>
+    </c:legend>
+    <c:plotVisOnly val="1"/>
+    <c:dispBlanksAs val="gap"/>
+    <c:showDLblsOverMax val="0"/>
+  </c:chart>
+  <c:spPr>
+    <a:noFill/>
+    <a:ln>
+      <a:noFill/>
+    </a:ln>
+    <a:effectLst/>
+  </c:spPr>
+  <c:txPr>
+    <a:bodyPr/>
+    <a:lstStyle/>
+    <a:p>
+      <a:pPr>
+        <a:defRPr/>
+      </a:pPr>
+      <a:endParaRPr lang="en-US"/>
+    </a:p>
+  </c:txPr>
+  <c:externalData r:id="rId3">
+    <c:autoUpdate val="0"/>
+  </c:externalData>
+</c:chartSpace>
+</file>
+
+<file path=ppt/charts/colors1.xml><?xml version="1.0" encoding="utf-8"?>
+<cs:colorStyle xmlns:cs="http://schemas.microsoft.com/office/drawing/2012/chartStyle" xmlns:a="http://schemas.openxmlformats.org/drawingml/2006/main" meth="cycle" id="10">
+  <a:schemeClr val="accent1"/>
+  <a:schemeClr val="accent2"/>
+  <a:schemeClr val="accent3"/>
+  <a:schemeClr val="accent4"/>
+  <a:schemeClr val="accent5"/>
+  <a:schemeClr val="accent6"/>
+  <cs:variation/>
+  <cs:variation>
+    <a:lumMod val="60000"/>
+  </cs:variation>
+  <cs:variation>
+    <a:lumMod val="80000"/>
+    <a:lumOff val="20000"/>
+  </cs:variation>
+  <cs:variation>
+    <a:lumMod val="80000"/>
+  </cs:variation>
+  <cs:variation>
+    <a:lumMod val="60000"/>
+    <a:lumOff val="40000"/>
+  </cs:variation>
+  <cs:variation>
+    <a:lumMod val="50000"/>
+  </cs:variation>
+  <cs:variation>
+    <a:lumMod val="70000"/>
+    <a:lumOff val="30000"/>
+  </cs:variation>
+  <cs:variation>
+    <a:lumMod val="70000"/>
+  </cs:variation>
+  <cs:variation>
+    <a:lumMod val="50000"/>
+    <a:lumOff val="50000"/>
+  </cs:variation>
+</cs:colorStyle>
+</file>
+
+<file path=ppt/charts/style1.xml><?xml version="1.0" encoding="utf-8"?>
+<cs:chartStyle xmlns:cs="http://schemas.microsoft.com/office/drawing/2012/chartStyle" xmlns:a="http://schemas.openxmlformats.org/drawingml/2006/main" id="297">
+  <cs:axisTitle>
+    <cs:lnRef idx="0"/>
+    <cs:fillRef idx="0"/>
+    <cs:effectRef idx="0"/>
+    <cs:fontRef idx="minor">
+      <a:schemeClr val="tx1">
+        <a:lumMod val="65000"/>
+        <a:lumOff val="35000"/>
+      </a:schemeClr>
+    </cs:fontRef>
+    <cs:defRPr sz="1330" kern="1200"/>
+  </cs:axisTitle>
+  <cs:categoryAxis>
+    <cs:lnRef idx="0"/>
+    <cs:fillRef idx="0"/>
+    <cs:effectRef idx="0"/>
+    <cs:fontRef idx="minor">
+      <a:schemeClr val="tx1">
+        <a:lumMod val="65000"/>
+        <a:lumOff val="35000"/>
+      </a:schemeClr>
+    </cs:fontRef>
+    <cs:spPr>
+      <a:ln w="9525" cap="flat" cmpd="sng" algn="ctr">
+        <a:solidFill>
+          <a:schemeClr val="tx1">
+            <a:lumMod val="15000"/>
+            <a:lumOff val="85000"/>
+          </a:schemeClr>
+        </a:solidFill>
+        <a:round/>
+      </a:ln>
+    </cs:spPr>
+    <cs:defRPr sz="1197" kern="1200"/>
+  </cs:categoryAxis>
+  <cs:chartArea mods="allowNoFillOverride allowNoLineOverride">
+    <cs:lnRef idx="0"/>
+    <cs:fillRef idx="0"/>
+    <cs:effectRef idx="0"/>
+    <cs:fontRef idx="minor">
+      <a:schemeClr val="tx1"/>
+    </cs:fontRef>
+    <cs:spPr>
+      <a:solidFill>
+        <a:schemeClr val="bg1"/>
+      </a:solidFill>
+      <a:ln w="9525" cap="flat" cmpd="sng" algn="ctr">
+        <a:solidFill>
+          <a:schemeClr val="tx1">
+            <a:lumMod val="15000"/>
+            <a:lumOff val="85000"/>
+          </a:schemeClr>
+        </a:solidFill>
+        <a:round/>
+      </a:ln>
+    </cs:spPr>
+    <cs:defRPr sz="1330" kern="1200"/>
+  </cs:chartArea>
+  <cs:dataLabel>
+    <cs:lnRef idx="0"/>
+    <cs:fillRef idx="0"/>
+    <cs:effectRef idx="0"/>
+    <cs:fontRef idx="minor">
+      <a:schemeClr val="tx1">
+        <a:lumMod val="75000"/>
+        <a:lumOff val="25000"/>
+      </a:schemeClr>
+    </cs:fontRef>
+    <cs:defRPr sz="1197" kern="1200"/>
+  </cs:dataLabel>
+  <cs:dataLabelCallout>
+    <cs:lnRef idx="0"/>
+    <cs:fillRef idx="0"/>
+    <cs:effectRef idx="0"/>
+    <cs:fontRef idx="minor">
+      <a:schemeClr val="dk1">
+        <a:lumMod val="65000"/>
+        <a:lumOff val="35000"/>
+      </a:schemeClr>
+    </cs:fontRef>
+    <cs:spPr>
+      <a:solidFill>
+        <a:schemeClr val="lt1"/>
+      </a:solidFill>
+      <a:ln>
+        <a:solidFill>
+          <a:schemeClr val="dk1">
+            <a:lumMod val="25000"/>
+            <a:lumOff val="75000"/>
+          </a:schemeClr>
+        </a:solidFill>
+      </a:ln>
+    </cs:spPr>
+    <cs:defRPr sz="1197" kern="1200"/>
+    <cs:bodyPr rot="0" spcFirstLastPara="1" vertOverflow="clip" horzOverflow="clip" vert="horz" wrap="square" lIns="36576" tIns="18288" rIns="36576" bIns="18288" anchor="ctr" anchorCtr="1">
+      <a:spAutoFit/>
+    </cs:bodyPr>
+  </cs:dataLabelCallout>
+  <cs:dataPoint>
+    <cs:lnRef idx="0"/>
+    <cs:fillRef idx="1">
+      <cs:styleClr val="auto"/>
+    </cs:fillRef>
+    <cs:effectRef idx="0"/>
+    <cs:fontRef idx="minor">
+      <a:schemeClr val="tx1"/>
+    </cs:fontRef>
+  </cs:dataPoint>
+  <cs:dataPoint3D>
+    <cs:lnRef idx="0"/>
+    <cs:fillRef idx="1">
+      <cs:styleClr val="auto"/>
+    </cs:fillRef>
+    <cs:effectRef idx="0"/>
+    <cs:fontRef idx="minor">
+      <a:schemeClr val="tx1"/>
+    </cs:fontRef>
+  </cs:dataPoint3D>
+  <cs:dataPointLine>
+    <cs:lnRef idx="0">
+      <cs:styleClr val="auto"/>
+    </cs:lnRef>
+    <cs:fillRef idx="1"/>
+    <cs:effectRef idx="0"/>
+    <cs:fontRef idx="minor">
+      <a:schemeClr val="tx1"/>
+    </cs:fontRef>
+    <cs:spPr>
+      <a:ln w="28575" cap="rnd">
+        <a:solidFill>
+          <a:schemeClr val="phClr"/>
+        </a:solidFill>
+        <a:round/>
+      </a:ln>
+    </cs:spPr>
+  </cs:dataPointLine>
+  <cs:dataPointMarker>
+    <cs:lnRef idx="0">
+      <cs:styleClr val="auto"/>
+    </cs:lnRef>
+    <cs:fillRef idx="1">
+      <cs:styleClr val="auto"/>
+    </cs:fillRef>
+    <cs:effectRef idx="0"/>
+    <cs:fontRef idx="minor">
+      <a:schemeClr val="tx1"/>
+    </cs:fontRef>
+    <cs:spPr>
+      <a:ln w="9525">
+        <a:solidFill>
+          <a:schemeClr val="phClr"/>
+        </a:solidFill>
+      </a:ln>
+    </cs:spPr>
+  </cs:dataPointMarker>
+  <cs:dataPointMarkerLayout symbol="circle" size="5"/>
+  <cs:dataPointWireframe>
+    <cs:lnRef idx="0">
+      <cs:styleClr val="auto"/>
+    </cs:lnRef>
+    <cs:fillRef idx="1"/>
+    <cs:effectRef idx="0"/>
+    <cs:fontRef idx="minor">
+      <a:schemeClr val="tx1"/>
+    </cs:fontRef>
+    <cs:spPr>
+      <a:ln w="9525" cap="rnd">
+        <a:solidFill>
+          <a:schemeClr val="phClr"/>
+        </a:solidFill>
+        <a:round/>
+      </a:ln>
+    </cs:spPr>
+  </cs:dataPointWireframe>
+  <cs:dataTable>
+    <cs:lnRef idx="0"/>
+    <cs:fillRef idx="0"/>
+    <cs:effectRef idx="0"/>
+    <cs:fontRef idx="minor">
+      <a:schemeClr val="tx1">
+        <a:lumMod val="65000"/>
+        <a:lumOff val="35000"/>
+      </a:schemeClr>
+    </cs:fontRef>
+    <cs:spPr>
+      <a:noFill/>
+      <a:ln w="9525" cap="flat" cmpd="sng" algn="ctr">
+        <a:solidFill>
+          <a:schemeClr val="tx1">
+            <a:lumMod val="15000"/>
+            <a:lumOff val="85000"/>
+          </a:schemeClr>
+        </a:solidFill>
+        <a:round/>
+      </a:ln>
+    </cs:spPr>
+    <cs:defRPr sz="1197" kern="1200"/>
+  </cs:dataTable>
+  <cs:downBar>
+    <cs:lnRef idx="0"/>
+    <cs:fillRef idx="0"/>
+    <cs:effectRef idx="0"/>
+    <cs:fontRef idx="minor">
+      <a:schemeClr val="tx1"/>
+    </cs:fontRef>
+    <cs:spPr>
+      <a:solidFill>
+        <a:schemeClr val="dk1">
+          <a:lumMod val="75000"/>
+          <a:lumOff val="25000"/>
+        </a:schemeClr>
+      </a:solidFill>
+      <a:ln w="9525" cap="flat" cmpd="sng" algn="ctr">
+        <a:solidFill>
+          <a:schemeClr val="tx1">
+            <a:lumMod val="65000"/>
+            <a:lumOff val="35000"/>
+          </a:schemeClr>
+        </a:solidFill>
+        <a:round/>
+      </a:ln>
+    </cs:spPr>
+  </cs:downBar>
+  <cs:dropLine>
+    <cs:lnRef idx="0"/>
+    <cs:fillRef idx="0"/>
+    <cs:effectRef idx="0"/>
+    <cs:fontRef idx="minor">
+      <a:schemeClr val="tx1"/>
+    </cs:fontRef>
+    <cs:spPr>
+      <a:ln w="9525" cap="flat" cmpd="sng" algn="ctr">
+        <a:solidFill>
+          <a:schemeClr val="tx1">
+            <a:lumMod val="35000"/>
+            <a:lumOff val="65000"/>
+          </a:schemeClr>
+        </a:solidFill>
+        <a:round/>
+      </a:ln>
+    </cs:spPr>
+  </cs:dropLine>
+  <cs:errorBar>
+    <cs:lnRef idx="0"/>
+    <cs:fillRef idx="0"/>
+    <cs:effectRef idx="0"/>
+    <cs:fontRef idx="minor">
+      <a:schemeClr val="tx1"/>
+    </cs:fontRef>
+    <cs:spPr>
+      <a:ln w="9525" cap="flat" cmpd="sng" algn="ctr">
+        <a:solidFill>
+          <a:schemeClr val="tx1">
+            <a:lumMod val="65000"/>
+            <a:lumOff val="35000"/>
+          </a:schemeClr>
+        </a:solidFill>
+        <a:round/>
+      </a:ln>
+    </cs:spPr>
+  </cs:errorBar>
+  <cs:floor>
+    <cs:lnRef idx="0"/>
+    <cs:fillRef idx="0"/>
+    <cs:effectRef idx="0"/>
+    <cs:fontRef idx="minor">
+      <a:schemeClr val="tx1"/>
+    </cs:fontRef>
+    <cs:spPr>
+      <a:noFill/>
+      <a:ln>
+        <a:noFill/>
+      </a:ln>
+    </cs:spPr>
+  </cs:floor>
+  <cs:gridlineMajor>
+    <cs:lnRef idx="0"/>
+    <cs:fillRef idx="0"/>
+    <cs:effectRef idx="0"/>
+    <cs:fontRef idx="minor">
+      <a:schemeClr val="tx1"/>
+    </cs:fontRef>
+    <cs:spPr>
+      <a:ln w="9525" cap="flat" cmpd="sng" algn="ctr">
+        <a:solidFill>
+          <a:schemeClr val="tx1">
+            <a:lumMod val="15000"/>
+            <a:lumOff val="85000"/>
+          </a:schemeClr>
+        </a:solidFill>
+        <a:round/>
+      </a:ln>
+    </cs:spPr>
+  </cs:gridlineMajor>
+  <cs:gridlineMinor>
+    <cs:lnRef idx="0"/>
+    <cs:fillRef idx="0"/>
+    <cs:effectRef idx="0"/>
+    <cs:fontRef idx="minor">
+      <a:schemeClr val="tx1"/>
+    </cs:fontRef>
+    <cs:spPr>
+      <a:ln w="9525" cap="flat" cmpd="sng" algn="ctr">
+        <a:solidFill>
+          <a:schemeClr val="tx1">
+            <a:lumMod val="5000"/>
+            <a:lumOff val="95000"/>
+          </a:schemeClr>
+        </a:solidFill>
+        <a:round/>
+      </a:ln>
+    </cs:spPr>
+  </cs:gridlineMinor>
+  <cs:hiLoLine>
+    <cs:lnRef idx="0"/>
+    <cs:fillRef idx="0"/>
+    <cs:effectRef idx="0"/>
+    <cs:fontRef idx="minor">
+      <a:schemeClr val="tx1"/>
+    </cs:fontRef>
+    <cs:spPr>
+      <a:ln w="9525" cap="flat" cmpd="sng" algn="ctr">
+        <a:solidFill>
+          <a:schemeClr val="tx1">
+            <a:lumMod val="50000"/>
+            <a:lumOff val="50000"/>
+          </a:schemeClr>
+        </a:solidFill>
+        <a:round/>
+      </a:ln>
+    </cs:spPr>
+  </cs:hiLoLine>
+  <cs:leaderLine>
+    <cs:lnRef idx="0"/>
+    <cs:fillRef idx="0"/>
+    <cs:effectRef idx="0"/>
+    <cs:fontRef idx="minor">
+      <a:schemeClr val="tx1"/>
+    </cs:fontRef>
+    <cs:spPr>
+      <a:ln w="9525" cap="flat" cmpd="sng" algn="ctr">
+        <a:solidFill>
+          <a:schemeClr val="tx1">
+            <a:lumMod val="35000"/>
+            <a:lumOff val="65000"/>
+          </a:schemeClr>
+        </a:solidFill>
+        <a:round/>
+      </a:ln>
+    </cs:spPr>
+  </cs:leaderLine>
+  <cs:legend>
+    <cs:lnRef idx="0"/>
+    <cs:fillRef idx="0"/>
+    <cs:effectRef idx="0"/>
+    <cs:fontRef idx="minor">
+      <a:schemeClr val="tx1">
+        <a:lumMod val="65000"/>
+        <a:lumOff val="35000"/>
+      </a:schemeClr>
+    </cs:fontRef>
+    <cs:defRPr sz="1197" kern="1200"/>
+  </cs:legend>
+  <cs:plotArea mods="allowNoFillOverride allowNoLineOverride">
+    <cs:lnRef idx="0"/>
+    <cs:fillRef idx="0"/>
+    <cs:effectRef idx="0"/>
+    <cs:fontRef idx="minor">
+      <a:schemeClr val="tx1"/>
+    </cs:fontRef>
+  </cs:plotArea>
+  <cs:plotArea3D mods="allowNoFillOverride allowNoLineOverride">
+    <cs:lnRef idx="0"/>
+    <cs:fillRef idx="0"/>
+    <cs:effectRef idx="0"/>
+    <cs:fontRef idx="minor">
+      <a:schemeClr val="tx1"/>
+    </cs:fontRef>
+  </cs:plotArea3D>
+  <cs:seriesAxis>
+    <cs:lnRef idx="0"/>
+    <cs:fillRef idx="0"/>
+    <cs:effectRef idx="0"/>
+    <cs:fontRef idx="minor">
+      <a:schemeClr val="tx1">
+        <a:lumMod val="65000"/>
+        <a:lumOff val="35000"/>
+      </a:schemeClr>
+    </cs:fontRef>
+    <cs:defRPr sz="1197" kern="1200"/>
+  </cs:seriesAxis>
+  <cs:seriesLine>
+    <cs:lnRef idx="0"/>
+    <cs:fillRef idx="0"/>
+    <cs:effectRef idx="0"/>
+    <cs:fontRef idx="minor">
+      <a:schemeClr val="tx1"/>
+    </cs:fontRef>
+    <cs:spPr>
+      <a:ln w="9525" cap="flat" cmpd="sng" algn="ctr">
+        <a:solidFill>
+          <a:schemeClr val="tx1">
+            <a:lumMod val="35000"/>
+            <a:lumOff val="65000"/>
+          </a:schemeClr>
+        </a:solidFill>
+        <a:round/>
+      </a:ln>
+    </cs:spPr>
+  </cs:seriesLine>
+  <cs:title>
+    <cs:lnRef idx="0"/>
+    <cs:fillRef idx="0"/>
+    <cs:effectRef idx="0"/>
+    <cs:fontRef idx="minor">
+      <a:schemeClr val="tx1">
+        <a:lumMod val="65000"/>
+        <a:lumOff val="35000"/>
+      </a:schemeClr>
+    </cs:fontRef>
+    <cs:defRPr sz="1862" b="0" kern="1200" spc="0" baseline="0"/>
+  </cs:title>
+  <cs:trendline>
+    <cs:lnRef idx="0">
+      <cs:styleClr val="auto"/>
+    </cs:lnRef>
+    <cs:fillRef idx="0"/>
+    <cs:effectRef idx="0"/>
+    <cs:fontRef idx="minor">
+      <a:schemeClr val="tx1"/>
+    </cs:fontRef>
+    <cs:spPr>
+      <a:ln w="19050" cap="rnd">
+        <a:solidFill>
+          <a:schemeClr val="phClr"/>
+        </a:solidFill>
+        <a:prstDash val="sysDot"/>
+      </a:ln>
+    </cs:spPr>
+  </cs:trendline>
+  <cs:trendlineLabel>
+    <cs:lnRef idx="0"/>
+    <cs:fillRef idx="0"/>
+    <cs:effectRef idx="0"/>
+    <cs:fontRef idx="minor">
+      <a:schemeClr val="tx1">
+        <a:lumMod val="65000"/>
+        <a:lumOff val="35000"/>
+      </a:schemeClr>
+    </cs:fontRef>
+    <cs:defRPr sz="1197" kern="1200"/>
+  </cs:trendlineLabel>
+  <cs:upBar>
+    <cs:lnRef idx="0"/>
+    <cs:fillRef idx="0"/>
+    <cs:effectRef idx="0"/>
+    <cs:fontRef idx="minor">
+      <a:schemeClr val="tx1"/>
+    </cs:fontRef>
+    <cs:spPr>
+      <a:solidFill>
+        <a:schemeClr val="lt1"/>
+      </a:solidFill>
+      <a:ln w="9525" cap="flat" cmpd="sng" algn="ctr">
+        <a:solidFill>
+          <a:schemeClr val="tx1">
+            <a:lumMod val="65000"/>
+            <a:lumOff val="35000"/>
+          </a:schemeClr>
+        </a:solidFill>
+        <a:round/>
+      </a:ln>
+    </cs:spPr>
+  </cs:upBar>
+  <cs:valueAxis>
+    <cs:lnRef idx="0"/>
+    <cs:fillRef idx="0"/>
+    <cs:effectRef idx="0"/>
+    <cs:fontRef idx="minor">
+      <a:schemeClr val="tx1">
+        <a:lumMod val="65000"/>
+        <a:lumOff val="35000"/>
+      </a:schemeClr>
+    </cs:fontRef>
+    <cs:defRPr sz="1197" kern="1200"/>
+  </cs:valueAxis>
+  <cs:wall>
+    <cs:lnRef idx="0"/>
+    <cs:fillRef idx="0"/>
+    <cs:effectRef idx="0"/>
+    <cs:fontRef idx="minor">
+      <a:schemeClr val="tx1"/>
+    </cs:fontRef>
+    <cs:spPr>
+      <a:noFill/>
+      <a:ln>
+        <a:noFill/>
+      </a:ln>
+    </cs:spPr>
+  </cs:wall>
+</cs:chartStyle>
+</file>
+
 <file path=ppt/notesMasters/notesMaster1.xml><?xml version="1.0" encoding="utf-8"?>
 <p:notesMaster xmlns:a="http://schemas.openxmlformats.org/drawingml/2006/main" xmlns:r="http://schemas.openxmlformats.org/officeDocument/2006/relationships" xmlns:p="http://schemas.openxmlformats.org/presentationml/2006/main">
   <p:cSld>
@@ -200,7 +1190,7 @@
           <a:p>
             <a:fld id="{04BFC0C1-2641-4C67-9270-B36183DF6C09}" type="datetimeFigureOut">
               <a:rPr lang="en-US" smtClean="0"/>
-              <a:t>12/7/2018</a:t>
+              <a:t>12/12/2018</a:t>
             </a:fld>
             <a:endParaRPr lang="en-US"/>
           </a:p>
@@ -564,6 +1554,90 @@
 </p:notes>
 </file>
 
+<file path=ppt/notesSlides/notesSlide10.xml><?xml version="1.0" encoding="utf-8"?>
+<p:notes xmlns:a="http://schemas.openxmlformats.org/drawingml/2006/main" xmlns:r="http://schemas.openxmlformats.org/officeDocument/2006/relationships" xmlns:p="http://schemas.openxmlformats.org/presentationml/2006/main">
+  <p:cSld>
+    <p:spTree>
+      <p:nvGrpSpPr>
+        <p:cNvPr id="1" name=""/>
+        <p:cNvGrpSpPr/>
+        <p:nvPr/>
+      </p:nvGrpSpPr>
+      <p:grpSpPr>
+        <a:xfrm>
+          <a:off x="0" y="0"/>
+          <a:ext cx="0" cy="0"/>
+          <a:chOff x="0" y="0"/>
+          <a:chExt cx="0" cy="0"/>
+        </a:xfrm>
+      </p:grpSpPr>
+      <p:sp>
+        <p:nvSpPr>
+          <p:cNvPr id="2" name="Slide Image Placeholder 1"/>
+          <p:cNvSpPr>
+            <a:spLocks noGrp="1" noRot="1" noChangeAspect="1"/>
+          </p:cNvSpPr>
+          <p:nvPr>
+            <p:ph type="sldImg"/>
+          </p:nvPr>
+        </p:nvSpPr>
+        <p:spPr/>
+      </p:sp>
+      <p:sp>
+        <p:nvSpPr>
+          <p:cNvPr id="3" name="Notes Placeholder 2"/>
+          <p:cNvSpPr>
+            <a:spLocks noGrp="1"/>
+          </p:cNvSpPr>
+          <p:nvPr>
+            <p:ph type="body" idx="1"/>
+          </p:nvPr>
+        </p:nvSpPr>
+        <p:spPr/>
+        <p:txBody>
+          <a:bodyPr/>
+          <a:lstStyle/>
+          <a:p>
+            <a:endParaRPr lang="en-US" dirty="0"/>
+          </a:p>
+        </p:txBody>
+      </p:sp>
+      <p:sp>
+        <p:nvSpPr>
+          <p:cNvPr id="4" name="Slide Number Placeholder 3"/>
+          <p:cNvSpPr>
+            <a:spLocks noGrp="1"/>
+          </p:cNvSpPr>
+          <p:nvPr>
+            <p:ph type="sldNum" sz="quarter" idx="10"/>
+          </p:nvPr>
+        </p:nvSpPr>
+        <p:spPr/>
+        <p:txBody>
+          <a:bodyPr/>
+          <a:lstStyle/>
+          <a:p>
+            <a:fld id="{744EE35B-D586-4169-AC32-43DC8E00890D}" type="slidenum">
+              <a:rPr lang="en-US" smtClean="0"/>
+              <a:t>13</a:t>
+            </a:fld>
+            <a:endParaRPr lang="en-US"/>
+          </a:p>
+        </p:txBody>
+      </p:sp>
+    </p:spTree>
+    <p:extLst>
+      <p:ext uri="{BB962C8B-B14F-4D97-AF65-F5344CB8AC3E}">
+        <p14:creationId xmlns:p14="http://schemas.microsoft.com/office/powerpoint/2010/main" val="878498129"/>
+      </p:ext>
+    </p:extLst>
+  </p:cSld>
+  <p:clrMapOvr>
+    <a:masterClrMapping/>
+  </p:clrMapOvr>
+</p:notes>
+</file>
+
 <file path=ppt/notesSlides/notesSlide2.xml><?xml version="1.0" encoding="utf-8"?>
 <p:notes xmlns:a="http://schemas.openxmlformats.org/drawingml/2006/main" xmlns:r="http://schemas.openxmlformats.org/officeDocument/2006/relationships" xmlns:p="http://schemas.openxmlformats.org/presentationml/2006/main">
   <p:cSld>
@@ -795,7 +1869,7 @@
             </a:r>
             <a:r>
               <a:rPr lang="en-US" baseline="0" dirty="0" smtClean="0"/>
-              <a:t> campaigns, given the category, </a:t>
+              <a:t> campaign, given the category, </a:t>
             </a:r>
           </a:p>
           <a:p>
@@ -928,7 +2002,34 @@
             </a:pPr>
             <a:r>
               <a:rPr lang="en-US" baseline="0" dirty="0" smtClean="0"/>
-              <a:t>But we did only look at campaigns that raised US dollars</a:t>
+              <a:t>But we did only look at campaigns that raised US </a:t>
+            </a:r>
+            <a:r>
+              <a:rPr lang="en-US" baseline="0" dirty="0" smtClean="0"/>
+              <a:t>dollars</a:t>
+            </a:r>
+          </a:p>
+          <a:p>
+            <a:pPr marL="171450" marR="0" lvl="0" indent="-171450" algn="l" defTabSz="914400" rtl="0" eaLnBrk="1" fontAlgn="auto" latinLnBrk="0" hangingPunct="1">
+              <a:lnSpc>
+                <a:spcPct val="100000"/>
+              </a:lnSpc>
+              <a:spcBef>
+                <a:spcPts val="0"/>
+              </a:spcBef>
+              <a:spcAft>
+                <a:spcPts val="0"/>
+              </a:spcAft>
+              <a:buClrTx/>
+              <a:buSzTx/>
+              <a:buFont typeface="Arial" panose="020B0604020202020204" pitchFamily="34" charset="0"/>
+              <a:buChar char="•"/>
+              <a:tabLst/>
+              <a:defRPr/>
+            </a:pPr>
+            <a:r>
+              <a:rPr lang="en-US" baseline="0" dirty="0" smtClean="0"/>
+              <a:t>We also chose to exclude outliers in amount pledged, goal amount, and number of backers</a:t>
             </a:r>
           </a:p>
           <a:p>
@@ -938,7 +2039,11 @@
             </a:pPr>
             <a:r>
               <a:rPr lang="en-US" baseline="0" dirty="0" smtClean="0"/>
-              <a:t>And we had data around the launch and deadline dates, goals, the total amount pledged, the number of backers, and whether or not it succeeded</a:t>
+              <a:t>And </a:t>
+            </a:r>
+            <a:r>
+              <a:rPr lang="en-US" baseline="0" dirty="0" smtClean="0"/>
+              <a:t>we had data around the launch and deadline dates, goals, the total amount pledged, the number of backers, and whether or not it succeeded</a:t>
             </a:r>
           </a:p>
           <a:p>
@@ -948,7 +2053,11 @@
             </a:pPr>
             <a:r>
               <a:rPr lang="en-US" baseline="0" dirty="0" smtClean="0"/>
-              <a:t>We chose to exclude outliers in amount pledged, goal amount, and number of backers</a:t>
+              <a:t>So </a:t>
+            </a:r>
+            <a:r>
+              <a:rPr lang="en-US" baseline="0" dirty="0" smtClean="0"/>
+              <a:t>what did we learn?</a:t>
             </a:r>
           </a:p>
           <a:p>
@@ -958,29 +2067,11 @@
             </a:pPr>
             <a:r>
               <a:rPr lang="en-US" baseline="0" dirty="0" smtClean="0"/>
-              <a:t>So what did we learn?</a:t>
-            </a:r>
-          </a:p>
-          <a:p>
-            <a:pPr marL="171450" indent="-171450">
-              <a:buFont typeface="Arial" panose="020B0604020202020204" pitchFamily="34" charset="0"/>
-              <a:buChar char="•"/>
-            </a:pPr>
+              <a:t>I’m going to turn it over to </a:t>
+            </a:r>
             <a:r>
               <a:rPr lang="en-US" baseline="0" dirty="0" smtClean="0"/>
-              <a:t>I’m going to turn it over to data expert </a:t>
-            </a:r>
-            <a:r>
-              <a:rPr lang="en-US" baseline="0" dirty="0" err="1" smtClean="0"/>
-              <a:t>Vyjayanthi</a:t>
-            </a:r>
-            <a:r>
-              <a:rPr lang="en-US" baseline="0" dirty="0" smtClean="0"/>
-              <a:t> to explain  &lt;Or whoever ends up speaking in the </a:t>
-            </a:r>
-            <a:r>
-              <a:rPr lang="en-US" baseline="0" smtClean="0"/>
-              <a:t>next section&gt;</a:t>
+              <a:t>Owen to explain </a:t>
             </a:r>
             <a:r>
               <a:rPr lang="en-US" dirty="0" smtClean="0"/>
@@ -1020,6 +2111,589 @@
     <p:extLst>
       <p:ext uri="{BB962C8B-B14F-4D97-AF65-F5344CB8AC3E}">
         <p14:creationId xmlns:p14="http://schemas.microsoft.com/office/powerpoint/2010/main" val="1997647926"/>
+      </p:ext>
+    </p:extLst>
+  </p:cSld>
+  <p:clrMapOvr>
+    <a:masterClrMapping/>
+  </p:clrMapOvr>
+</p:notes>
+</file>
+
+<file path=ppt/notesSlides/notesSlide5.xml><?xml version="1.0" encoding="utf-8"?>
+<p:notes xmlns:a="http://schemas.openxmlformats.org/drawingml/2006/main" xmlns:r="http://schemas.openxmlformats.org/officeDocument/2006/relationships" xmlns:p="http://schemas.openxmlformats.org/presentationml/2006/main">
+  <p:cSld>
+    <p:spTree>
+      <p:nvGrpSpPr>
+        <p:cNvPr id="1" name=""/>
+        <p:cNvGrpSpPr/>
+        <p:nvPr/>
+      </p:nvGrpSpPr>
+      <p:grpSpPr>
+        <a:xfrm>
+          <a:off x="0" y="0"/>
+          <a:ext cx="0" cy="0"/>
+          <a:chOff x="0" y="0"/>
+          <a:chExt cx="0" cy="0"/>
+        </a:xfrm>
+      </p:grpSpPr>
+      <p:sp>
+        <p:nvSpPr>
+          <p:cNvPr id="2" name="Slide Image Placeholder 1"/>
+          <p:cNvSpPr>
+            <a:spLocks noGrp="1" noRot="1" noChangeAspect="1"/>
+          </p:cNvSpPr>
+          <p:nvPr>
+            <p:ph type="sldImg"/>
+          </p:nvPr>
+        </p:nvSpPr>
+        <p:spPr/>
+      </p:sp>
+      <p:sp>
+        <p:nvSpPr>
+          <p:cNvPr id="3" name="Notes Placeholder 2"/>
+          <p:cNvSpPr>
+            <a:spLocks noGrp="1"/>
+          </p:cNvSpPr>
+          <p:nvPr>
+            <p:ph type="body" idx="1"/>
+          </p:nvPr>
+        </p:nvSpPr>
+        <p:spPr/>
+        <p:txBody>
+          <a:bodyPr/>
+          <a:lstStyle/>
+          <a:p>
+            <a:pPr marL="171450" indent="-171450">
+              <a:buFont typeface="Arial" panose="020B0604020202020204" pitchFamily="34" charset="0"/>
+              <a:buChar char="•"/>
+            </a:pPr>
+            <a:r>
+              <a:rPr lang="en-US" dirty="0" smtClean="0"/>
+              <a:t>Kickstarter remains a viable source of funding for entrepreneurs looking for seed funding to create products</a:t>
+            </a:r>
+          </a:p>
+          <a:p>
+            <a:pPr marL="171450" indent="-171450">
+              <a:buFont typeface="Arial" panose="020B0604020202020204" pitchFamily="34" charset="0"/>
+              <a:buChar char="•"/>
+            </a:pPr>
+            <a:r>
+              <a:rPr lang="en-US" dirty="0" smtClean="0"/>
+              <a:t>59% of all </a:t>
+            </a:r>
+            <a:r>
+              <a:rPr lang="en-US" dirty="0" err="1" smtClean="0"/>
+              <a:t>Kickstarters</a:t>
+            </a:r>
+            <a:r>
+              <a:rPr lang="en-US" dirty="0" smtClean="0"/>
+              <a:t> succeed</a:t>
+            </a:r>
+          </a:p>
+          <a:p>
+            <a:pPr marL="171450" indent="-171450">
+              <a:buFont typeface="Arial" panose="020B0604020202020204" pitchFamily="34" charset="0"/>
+              <a:buChar char="•"/>
+            </a:pPr>
+            <a:r>
+              <a:rPr lang="en-US" dirty="0" smtClean="0"/>
+              <a:t>after removing outliers, this percentage jumps to 67%</a:t>
+            </a:r>
+          </a:p>
+          <a:p>
+            <a:endParaRPr lang="en-US" dirty="0" smtClean="0"/>
+          </a:p>
+          <a:p>
+            <a:r>
+              <a:rPr lang="en-US" dirty="0" smtClean="0"/>
+              <a:t>*Feel free to replace with R plot – not sure if you created one or just calculated</a:t>
+            </a:r>
+            <a:r>
+              <a:rPr lang="en-US" baseline="0" dirty="0" smtClean="0"/>
+              <a:t> it</a:t>
+            </a:r>
+            <a:endParaRPr lang="en-US" dirty="0"/>
+          </a:p>
+        </p:txBody>
+      </p:sp>
+      <p:sp>
+        <p:nvSpPr>
+          <p:cNvPr id="4" name="Slide Number Placeholder 3"/>
+          <p:cNvSpPr>
+            <a:spLocks noGrp="1"/>
+          </p:cNvSpPr>
+          <p:nvPr>
+            <p:ph type="sldNum" sz="quarter" idx="10"/>
+          </p:nvPr>
+        </p:nvSpPr>
+        <p:spPr/>
+        <p:txBody>
+          <a:bodyPr/>
+          <a:lstStyle/>
+          <a:p>
+            <a:fld id="{744EE35B-D586-4169-AC32-43DC8E00890D}" type="slidenum">
+              <a:rPr lang="en-US" smtClean="0"/>
+              <a:t>6</a:t>
+            </a:fld>
+            <a:endParaRPr lang="en-US"/>
+          </a:p>
+        </p:txBody>
+      </p:sp>
+    </p:spTree>
+    <p:extLst>
+      <p:ext uri="{BB962C8B-B14F-4D97-AF65-F5344CB8AC3E}">
+        <p14:creationId xmlns:p14="http://schemas.microsoft.com/office/powerpoint/2010/main" val="1293949061"/>
+      </p:ext>
+    </p:extLst>
+  </p:cSld>
+  <p:clrMapOvr>
+    <a:masterClrMapping/>
+  </p:clrMapOvr>
+</p:notes>
+</file>
+
+<file path=ppt/notesSlides/notesSlide6.xml><?xml version="1.0" encoding="utf-8"?>
+<p:notes xmlns:a="http://schemas.openxmlformats.org/drawingml/2006/main" xmlns:r="http://schemas.openxmlformats.org/officeDocument/2006/relationships" xmlns:p="http://schemas.openxmlformats.org/presentationml/2006/main">
+  <p:cSld>
+    <p:spTree>
+      <p:nvGrpSpPr>
+        <p:cNvPr id="1" name=""/>
+        <p:cNvGrpSpPr/>
+        <p:nvPr/>
+      </p:nvGrpSpPr>
+      <p:grpSpPr>
+        <a:xfrm>
+          <a:off x="0" y="0"/>
+          <a:ext cx="0" cy="0"/>
+          <a:chOff x="0" y="0"/>
+          <a:chExt cx="0" cy="0"/>
+        </a:xfrm>
+      </p:grpSpPr>
+      <p:sp>
+        <p:nvSpPr>
+          <p:cNvPr id="2" name="Slide Image Placeholder 1"/>
+          <p:cNvSpPr>
+            <a:spLocks noGrp="1" noRot="1" noChangeAspect="1"/>
+          </p:cNvSpPr>
+          <p:nvPr>
+            <p:ph type="sldImg"/>
+          </p:nvPr>
+        </p:nvSpPr>
+        <p:spPr/>
+      </p:sp>
+      <p:sp>
+        <p:nvSpPr>
+          <p:cNvPr id="3" name="Notes Placeholder 2"/>
+          <p:cNvSpPr>
+            <a:spLocks noGrp="1"/>
+          </p:cNvSpPr>
+          <p:nvPr>
+            <p:ph type="body" idx="1"/>
+          </p:nvPr>
+        </p:nvSpPr>
+        <p:spPr/>
+        <p:txBody>
+          <a:bodyPr/>
+          <a:lstStyle/>
+          <a:p>
+            <a:pPr marL="171450" indent="-171450" fontAlgn="base">
+              <a:buFont typeface="Arial" panose="020B0604020202020204" pitchFamily="34" charset="0"/>
+              <a:buChar char="•"/>
+            </a:pPr>
+            <a:r>
+              <a:rPr lang="en-US" dirty="0" smtClean="0"/>
+              <a:t>Successful </a:t>
+            </a:r>
+            <a:r>
+              <a:rPr lang="en-US" dirty="0" err="1" smtClean="0"/>
+              <a:t>kickstarters</a:t>
+            </a:r>
+            <a:r>
+              <a:rPr lang="en-US" dirty="0" smtClean="0"/>
+              <a:t> are, on average, for about $6k</a:t>
+            </a:r>
+          </a:p>
+          <a:p>
+            <a:pPr marL="171450" indent="-171450" fontAlgn="base">
+              <a:buFont typeface="Arial" panose="020B0604020202020204" pitchFamily="34" charset="0"/>
+              <a:buChar char="•"/>
+            </a:pPr>
+            <a:r>
+              <a:rPr lang="en-US" dirty="0" smtClean="0"/>
+              <a:t>This number varies across categories</a:t>
+            </a:r>
+          </a:p>
+          <a:p>
+            <a:endParaRPr lang="en-US" dirty="0"/>
+          </a:p>
+        </p:txBody>
+      </p:sp>
+      <p:sp>
+        <p:nvSpPr>
+          <p:cNvPr id="4" name="Slide Number Placeholder 3"/>
+          <p:cNvSpPr>
+            <a:spLocks noGrp="1"/>
+          </p:cNvSpPr>
+          <p:nvPr>
+            <p:ph type="sldNum" sz="quarter" idx="10"/>
+          </p:nvPr>
+        </p:nvSpPr>
+        <p:spPr/>
+        <p:txBody>
+          <a:bodyPr/>
+          <a:lstStyle/>
+          <a:p>
+            <a:fld id="{744EE35B-D586-4169-AC32-43DC8E00890D}" type="slidenum">
+              <a:rPr lang="en-US" smtClean="0"/>
+              <a:t>7</a:t>
+            </a:fld>
+            <a:endParaRPr lang="en-US"/>
+          </a:p>
+        </p:txBody>
+      </p:sp>
+    </p:spTree>
+    <p:extLst>
+      <p:ext uri="{BB962C8B-B14F-4D97-AF65-F5344CB8AC3E}">
+        <p14:creationId xmlns:p14="http://schemas.microsoft.com/office/powerpoint/2010/main" val="1916624116"/>
+      </p:ext>
+    </p:extLst>
+  </p:cSld>
+  <p:clrMapOvr>
+    <a:masterClrMapping/>
+  </p:clrMapOvr>
+</p:notes>
+</file>
+
+<file path=ppt/notesSlides/notesSlide7.xml><?xml version="1.0" encoding="utf-8"?>
+<p:notes xmlns:a="http://schemas.openxmlformats.org/drawingml/2006/main" xmlns:r="http://schemas.openxmlformats.org/officeDocument/2006/relationships" xmlns:p="http://schemas.openxmlformats.org/presentationml/2006/main">
+  <p:cSld>
+    <p:spTree>
+      <p:nvGrpSpPr>
+        <p:cNvPr id="1" name=""/>
+        <p:cNvGrpSpPr/>
+        <p:nvPr/>
+      </p:nvGrpSpPr>
+      <p:grpSpPr>
+        <a:xfrm>
+          <a:off x="0" y="0"/>
+          <a:ext cx="0" cy="0"/>
+          <a:chOff x="0" y="0"/>
+          <a:chExt cx="0" cy="0"/>
+        </a:xfrm>
+      </p:grpSpPr>
+      <p:sp>
+        <p:nvSpPr>
+          <p:cNvPr id="2" name="Slide Image Placeholder 1"/>
+          <p:cNvSpPr>
+            <a:spLocks noGrp="1" noRot="1" noChangeAspect="1"/>
+          </p:cNvSpPr>
+          <p:nvPr>
+            <p:ph type="sldImg"/>
+          </p:nvPr>
+        </p:nvSpPr>
+        <p:spPr/>
+      </p:sp>
+      <p:sp>
+        <p:nvSpPr>
+          <p:cNvPr id="3" name="Notes Placeholder 2"/>
+          <p:cNvSpPr>
+            <a:spLocks noGrp="1"/>
+          </p:cNvSpPr>
+          <p:nvPr>
+            <p:ph type="body" idx="1"/>
+          </p:nvPr>
+        </p:nvSpPr>
+        <p:spPr/>
+        <p:txBody>
+          <a:bodyPr/>
+          <a:lstStyle/>
+          <a:p>
+            <a:pPr marL="171450" indent="-171450" fontAlgn="base">
+              <a:buFont typeface="Arial" panose="020B0604020202020204" pitchFamily="34" charset="0"/>
+              <a:buChar char="•"/>
+            </a:pPr>
+            <a:r>
+              <a:rPr lang="en-US" dirty="0" err="1" smtClean="0"/>
+              <a:t>Kickstarters</a:t>
+            </a:r>
+            <a:r>
+              <a:rPr lang="en-US" dirty="0" smtClean="0"/>
+              <a:t> that fail tend to have unreasonably high expectations that are out of line with what’s achievable </a:t>
+            </a:r>
+          </a:p>
+          <a:p>
+            <a:pPr marL="171450" indent="-171450" fontAlgn="base">
+              <a:buFont typeface="Arial" panose="020B0604020202020204" pitchFamily="34" charset="0"/>
+              <a:buChar char="•"/>
+            </a:pPr>
+            <a:r>
+              <a:rPr lang="en-US" dirty="0" smtClean="0"/>
+              <a:t>while the average goal of a successful KS is $6,093, the average goal of a failed KS is $8,248</a:t>
+            </a:r>
+          </a:p>
+          <a:p>
+            <a:endParaRPr lang="en-US" dirty="0"/>
+          </a:p>
+        </p:txBody>
+      </p:sp>
+      <p:sp>
+        <p:nvSpPr>
+          <p:cNvPr id="4" name="Slide Number Placeholder 3"/>
+          <p:cNvSpPr>
+            <a:spLocks noGrp="1"/>
+          </p:cNvSpPr>
+          <p:nvPr>
+            <p:ph type="sldNum" sz="quarter" idx="10"/>
+          </p:nvPr>
+        </p:nvSpPr>
+        <p:spPr/>
+        <p:txBody>
+          <a:bodyPr/>
+          <a:lstStyle/>
+          <a:p>
+            <a:fld id="{744EE35B-D586-4169-AC32-43DC8E00890D}" type="slidenum">
+              <a:rPr lang="en-US" smtClean="0"/>
+              <a:t>8</a:t>
+            </a:fld>
+            <a:endParaRPr lang="en-US"/>
+          </a:p>
+        </p:txBody>
+      </p:sp>
+    </p:spTree>
+    <p:extLst>
+      <p:ext uri="{BB962C8B-B14F-4D97-AF65-F5344CB8AC3E}">
+        <p14:creationId xmlns:p14="http://schemas.microsoft.com/office/powerpoint/2010/main" val="573155882"/>
+      </p:ext>
+    </p:extLst>
+  </p:cSld>
+  <p:clrMapOvr>
+    <a:masterClrMapping/>
+  </p:clrMapOvr>
+</p:notes>
+</file>
+
+<file path=ppt/notesSlides/notesSlide8.xml><?xml version="1.0" encoding="utf-8"?>
+<p:notes xmlns:a="http://schemas.openxmlformats.org/drawingml/2006/main" xmlns:r="http://schemas.openxmlformats.org/officeDocument/2006/relationships" xmlns:p="http://schemas.openxmlformats.org/presentationml/2006/main">
+  <p:cSld>
+    <p:spTree>
+      <p:nvGrpSpPr>
+        <p:cNvPr id="1" name=""/>
+        <p:cNvGrpSpPr/>
+        <p:nvPr/>
+      </p:nvGrpSpPr>
+      <p:grpSpPr>
+        <a:xfrm>
+          <a:off x="0" y="0"/>
+          <a:ext cx="0" cy="0"/>
+          <a:chOff x="0" y="0"/>
+          <a:chExt cx="0" cy="0"/>
+        </a:xfrm>
+      </p:grpSpPr>
+      <p:sp>
+        <p:nvSpPr>
+          <p:cNvPr id="2" name="Slide Image Placeholder 1"/>
+          <p:cNvSpPr>
+            <a:spLocks noGrp="1" noRot="1" noChangeAspect="1"/>
+          </p:cNvSpPr>
+          <p:nvPr>
+            <p:ph type="sldImg"/>
+          </p:nvPr>
+        </p:nvSpPr>
+        <p:spPr/>
+      </p:sp>
+      <p:sp>
+        <p:nvSpPr>
+          <p:cNvPr id="3" name="Notes Placeholder 2"/>
+          <p:cNvSpPr>
+            <a:spLocks noGrp="1"/>
+          </p:cNvSpPr>
+          <p:nvPr>
+            <p:ph type="body" idx="1"/>
+          </p:nvPr>
+        </p:nvSpPr>
+        <p:spPr/>
+        <p:txBody>
+          <a:bodyPr/>
+          <a:lstStyle/>
+          <a:p>
+            <a:pPr marL="171450" indent="-171450" fontAlgn="base">
+              <a:buFont typeface="Arial" panose="020B0604020202020204" pitchFamily="34" charset="0"/>
+              <a:buChar char="•"/>
+            </a:pPr>
+            <a:r>
+              <a:rPr lang="en-US" dirty="0" smtClean="0"/>
+              <a:t>To have a good Kickstarter, your product should ideally cost less than $32.42 </a:t>
+            </a:r>
+          </a:p>
+          <a:p>
+            <a:pPr marL="171450" indent="-171450" fontAlgn="base">
+              <a:buFont typeface="Arial" panose="020B0604020202020204" pitchFamily="34" charset="0"/>
+              <a:buChar char="•"/>
+            </a:pPr>
+            <a:r>
+              <a:rPr lang="en-US" dirty="0" smtClean="0"/>
+              <a:t>Calculated this number by averaging pledge</a:t>
+            </a:r>
+            <a:r>
+              <a:rPr lang="en-US" baseline="0" dirty="0" smtClean="0"/>
+              <a:t> totals</a:t>
+            </a:r>
+            <a:r>
+              <a:rPr lang="en-US" dirty="0" smtClean="0"/>
+              <a:t> of successful KS divided by the average backers</a:t>
+            </a:r>
+          </a:p>
+          <a:p>
+            <a:pPr marL="171450" indent="-171450" fontAlgn="base">
+              <a:buFont typeface="Arial" panose="020B0604020202020204" pitchFamily="34" charset="0"/>
+              <a:buChar char="•"/>
+            </a:pPr>
+            <a:r>
+              <a:rPr lang="en-US" dirty="0" smtClean="0"/>
+              <a:t>These numbers vary across categories</a:t>
+            </a:r>
+          </a:p>
+          <a:p>
+            <a:endParaRPr lang="en-US" dirty="0" smtClean="0"/>
+          </a:p>
+          <a:p>
+            <a:endParaRPr lang="en-US" dirty="0"/>
+          </a:p>
+        </p:txBody>
+      </p:sp>
+      <p:sp>
+        <p:nvSpPr>
+          <p:cNvPr id="4" name="Slide Number Placeholder 3"/>
+          <p:cNvSpPr>
+            <a:spLocks noGrp="1"/>
+          </p:cNvSpPr>
+          <p:nvPr>
+            <p:ph type="sldNum" sz="quarter" idx="10"/>
+          </p:nvPr>
+        </p:nvSpPr>
+        <p:spPr/>
+        <p:txBody>
+          <a:bodyPr/>
+          <a:lstStyle/>
+          <a:p>
+            <a:fld id="{744EE35B-D586-4169-AC32-43DC8E00890D}" type="slidenum">
+              <a:rPr lang="en-US" smtClean="0"/>
+              <a:t>9</a:t>
+            </a:fld>
+            <a:endParaRPr lang="en-US"/>
+          </a:p>
+        </p:txBody>
+      </p:sp>
+    </p:spTree>
+    <p:extLst>
+      <p:ext uri="{BB962C8B-B14F-4D97-AF65-F5344CB8AC3E}">
+        <p14:creationId xmlns:p14="http://schemas.microsoft.com/office/powerpoint/2010/main" val="3861492504"/>
+      </p:ext>
+    </p:extLst>
+  </p:cSld>
+  <p:clrMapOvr>
+    <a:masterClrMapping/>
+  </p:clrMapOvr>
+</p:notes>
+</file>
+
+<file path=ppt/notesSlides/notesSlide9.xml><?xml version="1.0" encoding="utf-8"?>
+<p:notes xmlns:a="http://schemas.openxmlformats.org/drawingml/2006/main" xmlns:r="http://schemas.openxmlformats.org/officeDocument/2006/relationships" xmlns:p="http://schemas.openxmlformats.org/presentationml/2006/main">
+  <p:cSld>
+    <p:spTree>
+      <p:nvGrpSpPr>
+        <p:cNvPr id="1" name=""/>
+        <p:cNvGrpSpPr/>
+        <p:nvPr/>
+      </p:nvGrpSpPr>
+      <p:grpSpPr>
+        <a:xfrm>
+          <a:off x="0" y="0"/>
+          <a:ext cx="0" cy="0"/>
+          <a:chOff x="0" y="0"/>
+          <a:chExt cx="0" cy="0"/>
+        </a:xfrm>
+      </p:grpSpPr>
+      <p:sp>
+        <p:nvSpPr>
+          <p:cNvPr id="2" name="Slide Image Placeholder 1"/>
+          <p:cNvSpPr>
+            <a:spLocks noGrp="1" noRot="1" noChangeAspect="1"/>
+          </p:cNvSpPr>
+          <p:nvPr>
+            <p:ph type="sldImg"/>
+          </p:nvPr>
+        </p:nvSpPr>
+        <p:spPr/>
+      </p:sp>
+      <p:sp>
+        <p:nvSpPr>
+          <p:cNvPr id="3" name="Notes Placeholder 2"/>
+          <p:cNvSpPr>
+            <a:spLocks noGrp="1"/>
+          </p:cNvSpPr>
+          <p:nvPr>
+            <p:ph type="body" idx="1"/>
+          </p:nvPr>
+        </p:nvSpPr>
+        <p:spPr/>
+        <p:txBody>
+          <a:bodyPr/>
+          <a:lstStyle/>
+          <a:p>
+            <a:pPr fontAlgn="base"/>
+            <a:r>
+              <a:rPr lang="en-US" dirty="0" smtClean="0"/>
+              <a:t>You also need to ship more than 187 units at that price</a:t>
+            </a:r>
+          </a:p>
+          <a:p>
+            <a:pPr fontAlgn="base"/>
+            <a:r>
+              <a:rPr lang="en-US" dirty="0" smtClean="0"/>
+              <a:t>Calculated as the average number of backers for a project</a:t>
+            </a:r>
+          </a:p>
+          <a:p>
+            <a:pPr fontAlgn="base"/>
+            <a:r>
+              <a:rPr lang="en-US" dirty="0" smtClean="0"/>
+              <a:t>This number varies across categories</a:t>
+            </a:r>
+          </a:p>
+          <a:p>
+            <a:endParaRPr lang="en-US" dirty="0"/>
+          </a:p>
+        </p:txBody>
+      </p:sp>
+      <p:sp>
+        <p:nvSpPr>
+          <p:cNvPr id="4" name="Slide Number Placeholder 3"/>
+          <p:cNvSpPr>
+            <a:spLocks noGrp="1"/>
+          </p:cNvSpPr>
+          <p:nvPr>
+            <p:ph type="sldNum" sz="quarter" idx="10"/>
+          </p:nvPr>
+        </p:nvSpPr>
+        <p:spPr/>
+        <p:txBody>
+          <a:bodyPr/>
+          <a:lstStyle/>
+          <a:p>
+            <a:fld id="{744EE35B-D586-4169-AC32-43DC8E00890D}" type="slidenum">
+              <a:rPr lang="en-US" smtClean="0"/>
+              <a:t>10</a:t>
+            </a:fld>
+            <a:endParaRPr lang="en-US"/>
+          </a:p>
+        </p:txBody>
+      </p:sp>
+    </p:spTree>
+    <p:extLst>
+      <p:ext uri="{BB962C8B-B14F-4D97-AF65-F5344CB8AC3E}">
+        <p14:creationId xmlns:p14="http://schemas.microsoft.com/office/powerpoint/2010/main" val="1482489005"/>
       </p:ext>
     </p:extLst>
   </p:cSld>
@@ -1317,7 +2991,7 @@
             <a:fld id="{08B9EBBA-996F-894A-B54A-D6246ED52CEA}" type="datetimeFigureOut">
               <a:rPr lang="en-US" dirty="0"/>
               <a:pPr/>
-              <a:t>12/7/2018</a:t>
+              <a:t>12/12/2018</a:t>
             </a:fld>
             <a:endParaRPr lang="en-US" dirty="0"/>
           </a:p>
@@ -1632,7 +3306,7 @@
             <a:fld id="{18C79C5D-2A6F-F04D-97DA-BEF2467B64E4}" type="datetimeFigureOut">
               <a:rPr lang="en-US" dirty="0"/>
               <a:pPr/>
-              <a:t>12/7/2018</a:t>
+              <a:t>12/12/2018</a:t>
             </a:fld>
             <a:endParaRPr lang="en-US" dirty="0"/>
           </a:p>
@@ -2117,7 +3791,7 @@
             <a:fld id="{8DFA1846-DA80-1C48-A609-854EA85C59AD}" type="datetimeFigureOut">
               <a:rPr lang="en-US" dirty="0"/>
               <a:pPr/>
-              <a:t>12/7/2018</a:t>
+              <a:t>12/12/2018</a:t>
             </a:fld>
             <a:endParaRPr lang="en-US" dirty="0"/>
           </a:p>
@@ -2483,7 +4157,7 @@
             <a:fld id="{FBF54567-0DE4-3F47-BF90-CB84690072F9}" type="datetimeFigureOut">
               <a:rPr lang="en-US" dirty="0"/>
               <a:pPr/>
-              <a:t>12/7/2018</a:t>
+              <a:t>12/12/2018</a:t>
             </a:fld>
             <a:endParaRPr lang="en-US" dirty="0"/>
           </a:p>
@@ -2753,7 +4427,7 @@
             <a:fld id="{C6C52C72-DE31-F449-A4ED-4C594FD91407}" type="datetimeFigureOut">
               <a:rPr lang="en-US" dirty="0"/>
               <a:pPr/>
-              <a:t>12/7/2018</a:t>
+              <a:t>12/12/2018</a:t>
             </a:fld>
             <a:endParaRPr lang="en-US" dirty="0"/>
           </a:p>
@@ -3035,7 +4709,7 @@
             <a:fld id="{ED62726E-379B-B349-9EED-81ED093FA806}" type="datetimeFigureOut">
               <a:rPr lang="en-US" dirty="0"/>
               <a:pPr/>
-              <a:t>12/7/2018</a:t>
+              <a:t>12/12/2018</a:t>
             </a:fld>
             <a:endParaRPr lang="en-US" dirty="0"/>
           </a:p>
@@ -3315,7 +4989,7 @@
             <a:fld id="{9B3A1323-8D79-1946-B0D7-40001CF92E9D}" type="datetimeFigureOut">
               <a:rPr lang="en-US" dirty="0"/>
               <a:pPr/>
-              <a:t>12/7/2018</a:t>
+              <a:t>12/12/2018</a:t>
             </a:fld>
             <a:endParaRPr lang="en-US" dirty="0"/>
           </a:p>
@@ -3655,7 +5329,7 @@
             <a:fld id="{8DFA1846-DA80-1C48-A609-854EA85C59AD}" type="datetimeFigureOut">
               <a:rPr lang="en-US" dirty="0"/>
               <a:pPr/>
-              <a:t>12/7/2018</a:t>
+              <a:t>12/12/2018</a:t>
             </a:fld>
             <a:endParaRPr lang="en-US" dirty="0"/>
           </a:p>
@@ -3991,7 +5665,7 @@
             <a:fld id="{57302355-E14B-8545-A8F8-0FE83CC9D524}" type="datetimeFigureOut">
               <a:rPr lang="en-US" dirty="0"/>
               <a:pPr/>
-              <a:t>12/7/2018</a:t>
+              <a:t>12/12/2018</a:t>
             </a:fld>
             <a:endParaRPr lang="en-US" dirty="0"/>
           </a:p>
@@ -4465,7 +6139,7 @@
             <a:fld id="{02640F58-564D-2B4F-AE67-E407BA4FCF45}" type="datetimeFigureOut">
               <a:rPr lang="en-US" dirty="0"/>
               <a:pPr/>
-              <a:t>12/7/2018</a:t>
+              <a:t>12/12/2018</a:t>
             </a:fld>
             <a:endParaRPr lang="en-US" dirty="0"/>
           </a:p>
@@ -4683,7 +6357,7 @@
             <a:fld id="{F13A34C8-038E-2045-AF43-DF7DBB8E0E9E}" type="datetimeFigureOut">
               <a:rPr lang="en-US" dirty="0"/>
               <a:pPr/>
-              <a:t>12/7/2018</a:t>
+              <a:t>12/12/2018</a:t>
             </a:fld>
             <a:endParaRPr lang="en-US" dirty="0"/>
           </a:p>
@@ -4775,7 +6449,7 @@
             <a:fld id="{8818C68F-D26B-8F47-958C-23B49CF8A634}" type="datetimeFigureOut">
               <a:rPr lang="en-US" dirty="0"/>
               <a:pPr/>
-              <a:t>12/7/2018</a:t>
+              <a:t>12/12/2018</a:t>
             </a:fld>
             <a:endParaRPr lang="en-US" dirty="0"/>
           </a:p>
@@ -5239,7 +6913,7 @@
             <a:fld id="{D0DF5E60-9974-AC48-9591-99C2BB44B7CF}" type="datetimeFigureOut">
               <a:rPr lang="en-US" dirty="0"/>
               <a:pPr/>
-              <a:t>12/7/2018</a:t>
+              <a:t>12/12/2018</a:t>
             </a:fld>
             <a:endParaRPr lang="en-US" dirty="0"/>
           </a:p>
@@ -5549,7 +7223,7 @@
             <a:fld id="{18C79C5D-2A6F-F04D-97DA-BEF2467B64E4}" type="datetimeFigureOut">
               <a:rPr lang="en-US" dirty="0"/>
               <a:pPr/>
-              <a:t>12/7/2018</a:t>
+              <a:t>12/12/2018</a:t>
             </a:fld>
             <a:endParaRPr lang="en-US" dirty="0"/>
           </a:p>
@@ -5816,7 +7490,7 @@
             <a:fld id="{09B482E8-6E0E-1B4F-B1FD-C69DB9E858D9}" type="datetimeFigureOut">
               <a:rPr lang="en-US" dirty="0"/>
               <a:pPr/>
-              <a:t>12/7/2018</a:t>
+              <a:t>12/12/2018</a:t>
             </a:fld>
             <a:endParaRPr lang="en-US" dirty="0"/>
           </a:p>
@@ -6349,6 +8023,353 @@
 </p:sld>
 </file>
 
+<file path=ppt/slides/slide10.xml><?xml version="1.0" encoding="utf-8"?>
+<p:sld xmlns:a="http://schemas.openxmlformats.org/drawingml/2006/main" xmlns:r="http://schemas.openxmlformats.org/officeDocument/2006/relationships" xmlns:p="http://schemas.openxmlformats.org/presentationml/2006/main">
+  <p:cSld>
+    <p:spTree>
+      <p:nvGrpSpPr>
+        <p:cNvPr id="1" name=""/>
+        <p:cNvGrpSpPr/>
+        <p:nvPr/>
+      </p:nvGrpSpPr>
+      <p:grpSpPr>
+        <a:xfrm>
+          <a:off x="0" y="0"/>
+          <a:ext cx="0" cy="0"/>
+          <a:chOff x="0" y="0"/>
+          <a:chExt cx="0" cy="0"/>
+        </a:xfrm>
+      </p:grpSpPr>
+      <p:sp>
+        <p:nvSpPr>
+          <p:cNvPr id="2" name="Title 1"/>
+          <p:cNvSpPr>
+            <a:spLocks noGrp="1"/>
+          </p:cNvSpPr>
+          <p:nvPr>
+            <p:ph type="title"/>
+          </p:nvPr>
+        </p:nvSpPr>
+        <p:spPr/>
+        <p:txBody>
+          <a:bodyPr/>
+          <a:lstStyle/>
+          <a:p>
+            <a:r>
+              <a:rPr lang="en-US" dirty="0" smtClean="0"/>
+              <a:t>On average, you’ll need 187 backers</a:t>
+            </a:r>
+            <a:endParaRPr lang="en-US" dirty="0"/>
+          </a:p>
+        </p:txBody>
+      </p:sp>
+      <p:sp>
+        <p:nvSpPr>
+          <p:cNvPr id="3" name="Content Placeholder 2"/>
+          <p:cNvSpPr>
+            <a:spLocks noGrp="1"/>
+          </p:cNvSpPr>
+          <p:nvPr>
+            <p:ph idx="1"/>
+          </p:nvPr>
+        </p:nvSpPr>
+        <p:spPr/>
+        <p:txBody>
+          <a:bodyPr/>
+          <a:lstStyle/>
+          <a:p>
+            <a:pPr lvl="1" fontAlgn="base"/>
+            <a:r>
+              <a:rPr lang="en-US" dirty="0" smtClean="0">
+                <a:solidFill>
+                  <a:srgbClr val="FF0000"/>
+                </a:solidFill>
+              </a:rPr>
+              <a:t>Insert </a:t>
+            </a:r>
+            <a:r>
+              <a:rPr lang="en-US" dirty="0">
+                <a:solidFill>
+                  <a:srgbClr val="FF0000"/>
+                </a:solidFill>
+              </a:rPr>
+              <a:t>plot of this number across different categories</a:t>
+            </a:r>
+          </a:p>
+          <a:p>
+            <a:endParaRPr lang="en-US" dirty="0"/>
+          </a:p>
+        </p:txBody>
+      </p:sp>
+    </p:spTree>
+    <p:extLst>
+      <p:ext uri="{BB962C8B-B14F-4D97-AF65-F5344CB8AC3E}">
+        <p14:creationId xmlns:p14="http://schemas.microsoft.com/office/powerpoint/2010/main" val="465268213"/>
+      </p:ext>
+    </p:extLst>
+  </p:cSld>
+  <p:clrMapOvr>
+    <a:masterClrMapping/>
+  </p:clrMapOvr>
+</p:sld>
+</file>
+
+<file path=ppt/slides/slide11.xml><?xml version="1.0" encoding="utf-8"?>
+<p:sld xmlns:a="http://schemas.openxmlformats.org/drawingml/2006/main" xmlns:r="http://schemas.openxmlformats.org/officeDocument/2006/relationships" xmlns:p="http://schemas.openxmlformats.org/presentationml/2006/main">
+  <p:cSld>
+    <p:spTree>
+      <p:nvGrpSpPr>
+        <p:cNvPr id="1" name=""/>
+        <p:cNvGrpSpPr/>
+        <p:nvPr/>
+      </p:nvGrpSpPr>
+      <p:grpSpPr>
+        <a:xfrm>
+          <a:off x="0" y="0"/>
+          <a:ext cx="0" cy="0"/>
+          <a:chOff x="0" y="0"/>
+          <a:chExt cx="0" cy="0"/>
+        </a:xfrm>
+      </p:grpSpPr>
+      <p:sp>
+        <p:nvSpPr>
+          <p:cNvPr id="2" name="Title 1"/>
+          <p:cNvSpPr>
+            <a:spLocks noGrp="1"/>
+          </p:cNvSpPr>
+          <p:nvPr>
+            <p:ph type="title"/>
+          </p:nvPr>
+        </p:nvSpPr>
+        <p:spPr/>
+        <p:txBody>
+          <a:bodyPr/>
+          <a:lstStyle/>
+          <a:p>
+            <a:r>
+              <a:rPr lang="en-US" dirty="0" smtClean="0"/>
+              <a:t>What this means for YOU</a:t>
+            </a:r>
+            <a:endParaRPr lang="en-US" dirty="0"/>
+          </a:p>
+        </p:txBody>
+      </p:sp>
+      <p:sp>
+        <p:nvSpPr>
+          <p:cNvPr id="4" name="Text Placeholder 3"/>
+          <p:cNvSpPr>
+            <a:spLocks noGrp="1"/>
+          </p:cNvSpPr>
+          <p:nvPr>
+            <p:ph type="body" idx="1"/>
+          </p:nvPr>
+        </p:nvSpPr>
+        <p:spPr/>
+        <p:txBody>
+          <a:bodyPr/>
+          <a:lstStyle/>
+          <a:p>
+            <a:endParaRPr lang="en-US"/>
+          </a:p>
+        </p:txBody>
+      </p:sp>
+    </p:spTree>
+    <p:extLst>
+      <p:ext uri="{BB962C8B-B14F-4D97-AF65-F5344CB8AC3E}">
+        <p14:creationId xmlns:p14="http://schemas.microsoft.com/office/powerpoint/2010/main" val="788777043"/>
+      </p:ext>
+    </p:extLst>
+  </p:cSld>
+  <p:clrMapOvr>
+    <a:masterClrMapping/>
+  </p:clrMapOvr>
+</p:sld>
+</file>
+
+<file path=ppt/slides/slide12.xml><?xml version="1.0" encoding="utf-8"?>
+<p:sld xmlns:a="http://schemas.openxmlformats.org/drawingml/2006/main" xmlns:r="http://schemas.openxmlformats.org/officeDocument/2006/relationships" xmlns:p="http://schemas.openxmlformats.org/presentationml/2006/main">
+  <p:cSld>
+    <p:spTree>
+      <p:nvGrpSpPr>
+        <p:cNvPr id="1" name=""/>
+        <p:cNvGrpSpPr/>
+        <p:nvPr/>
+      </p:nvGrpSpPr>
+      <p:grpSpPr>
+        <a:xfrm>
+          <a:off x="0" y="0"/>
+          <a:ext cx="0" cy="0"/>
+          <a:chOff x="0" y="0"/>
+          <a:chExt cx="0" cy="0"/>
+        </a:xfrm>
+      </p:grpSpPr>
+      <p:sp>
+        <p:nvSpPr>
+          <p:cNvPr id="2" name="Title 1"/>
+          <p:cNvSpPr>
+            <a:spLocks noGrp="1"/>
+          </p:cNvSpPr>
+          <p:nvPr>
+            <p:ph type="title"/>
+          </p:nvPr>
+        </p:nvSpPr>
+        <p:spPr/>
+        <p:txBody>
+          <a:bodyPr/>
+          <a:lstStyle/>
+          <a:p>
+            <a:r>
+              <a:rPr lang="en-US" dirty="0" smtClean="0"/>
+              <a:t>Know before you go</a:t>
+            </a:r>
+            <a:endParaRPr lang="en-US" dirty="0"/>
+          </a:p>
+        </p:txBody>
+      </p:sp>
+      <p:sp>
+        <p:nvSpPr>
+          <p:cNvPr id="3" name="Content Placeholder 2"/>
+          <p:cNvSpPr>
+            <a:spLocks noGrp="1"/>
+          </p:cNvSpPr>
+          <p:nvPr>
+            <p:ph idx="1"/>
+          </p:nvPr>
+        </p:nvSpPr>
+        <p:spPr/>
+        <p:txBody>
+          <a:bodyPr/>
+          <a:lstStyle/>
+          <a:p>
+            <a:r>
+              <a:rPr lang="en-US" dirty="0" smtClean="0"/>
+              <a:t>Know YOUR tipping point</a:t>
+            </a:r>
+          </a:p>
+          <a:p>
+            <a:pPr lvl="1"/>
+            <a:r>
+              <a:rPr lang="en-US" dirty="0" smtClean="0"/>
+              <a:t>In this category/subcategory, will you do better than break even?</a:t>
+            </a:r>
+          </a:p>
+          <a:p>
+            <a:r>
+              <a:rPr lang="en-US" dirty="0" smtClean="0"/>
+              <a:t>Decide on YOUR strategy</a:t>
+            </a:r>
+          </a:p>
+          <a:p>
+            <a:pPr lvl="1"/>
+            <a:r>
+              <a:rPr lang="en-US" dirty="0" smtClean="0"/>
+              <a:t>Minimize costs or maximize profits?</a:t>
+            </a:r>
+            <a:endParaRPr lang="en-US" dirty="0"/>
+          </a:p>
+        </p:txBody>
+      </p:sp>
+    </p:spTree>
+    <p:extLst>
+      <p:ext uri="{BB962C8B-B14F-4D97-AF65-F5344CB8AC3E}">
+        <p14:creationId xmlns:p14="http://schemas.microsoft.com/office/powerpoint/2010/main" val="1616027174"/>
+      </p:ext>
+    </p:extLst>
+  </p:cSld>
+  <p:clrMapOvr>
+    <a:masterClrMapping/>
+  </p:clrMapOvr>
+</p:sld>
+</file>
+
+<file path=ppt/slides/slide13.xml><?xml version="1.0" encoding="utf-8"?>
+<p:sld xmlns:a="http://schemas.openxmlformats.org/drawingml/2006/main" xmlns:r="http://schemas.openxmlformats.org/officeDocument/2006/relationships" xmlns:p="http://schemas.openxmlformats.org/presentationml/2006/main">
+  <p:cSld>
+    <p:spTree>
+      <p:nvGrpSpPr>
+        <p:cNvPr id="1" name=""/>
+        <p:cNvGrpSpPr/>
+        <p:nvPr/>
+      </p:nvGrpSpPr>
+      <p:grpSpPr>
+        <a:xfrm>
+          <a:off x="0" y="0"/>
+          <a:ext cx="0" cy="0"/>
+          <a:chOff x="0" y="0"/>
+          <a:chExt cx="0" cy="0"/>
+        </a:xfrm>
+      </p:grpSpPr>
+      <p:sp>
+        <p:nvSpPr>
+          <p:cNvPr id="2" name="Title 1"/>
+          <p:cNvSpPr>
+            <a:spLocks noGrp="1"/>
+          </p:cNvSpPr>
+          <p:nvPr>
+            <p:ph type="title"/>
+          </p:nvPr>
+        </p:nvSpPr>
+        <p:spPr/>
+        <p:txBody>
+          <a:bodyPr/>
+          <a:lstStyle/>
+          <a:p>
+            <a:r>
+              <a:rPr lang="en-US" dirty="0" smtClean="0"/>
+              <a:t>What’s your number?</a:t>
+            </a:r>
+            <a:endParaRPr lang="en-US" dirty="0"/>
+          </a:p>
+        </p:txBody>
+      </p:sp>
+      <p:sp>
+        <p:nvSpPr>
+          <p:cNvPr id="3" name="Content Placeholder 2"/>
+          <p:cNvSpPr>
+            <a:spLocks noGrp="1"/>
+          </p:cNvSpPr>
+          <p:nvPr>
+            <p:ph idx="1"/>
+          </p:nvPr>
+        </p:nvSpPr>
+        <p:spPr/>
+        <p:txBody>
+          <a:bodyPr/>
+          <a:lstStyle/>
+          <a:p>
+            <a:r>
+              <a:rPr lang="en-US" dirty="0" smtClean="0"/>
+              <a:t>Find out the hassle-free way  -- let us find out for you!</a:t>
+            </a:r>
+          </a:p>
+          <a:p>
+            <a:r>
+              <a:rPr lang="en-US" dirty="0" smtClean="0"/>
+              <a:t>We’ll provide customized recommendations based on your category and subcategory</a:t>
+            </a:r>
+          </a:p>
+          <a:p>
+            <a:r>
+              <a:rPr lang="en-US" dirty="0" smtClean="0"/>
+              <a:t>Not sure what category fits best?  We can help with that, too!</a:t>
+            </a:r>
+            <a:endParaRPr lang="en-US" dirty="0"/>
+          </a:p>
+        </p:txBody>
+      </p:sp>
+    </p:spTree>
+    <p:extLst>
+      <p:ext uri="{BB962C8B-B14F-4D97-AF65-F5344CB8AC3E}">
+        <p14:creationId xmlns:p14="http://schemas.microsoft.com/office/powerpoint/2010/main" val="1167543556"/>
+      </p:ext>
+    </p:extLst>
+  </p:cSld>
+  <p:clrMapOvr>
+    <a:masterClrMapping/>
+  </p:clrMapOvr>
+</p:sld>
+</file>
+
 <file path=ppt/slides/slide2.xml><?xml version="1.0" encoding="utf-8"?>
 <p:sld xmlns:a="http://schemas.openxmlformats.org/drawingml/2006/main" xmlns:r="http://schemas.openxmlformats.org/officeDocument/2006/relationships" xmlns:p="http://schemas.openxmlformats.org/presentationml/2006/main">
   <p:cSld>
@@ -6713,6 +8734,473 @@
     <p:extLst>
       <p:ext uri="{BB962C8B-B14F-4D97-AF65-F5344CB8AC3E}">
         <p14:creationId xmlns:p14="http://schemas.microsoft.com/office/powerpoint/2010/main" val="3494367705"/>
+      </p:ext>
+    </p:extLst>
+  </p:cSld>
+  <p:clrMapOvr>
+    <a:masterClrMapping/>
+  </p:clrMapOvr>
+</p:sld>
+</file>
+
+<file path=ppt/slides/slide5.xml><?xml version="1.0" encoding="utf-8"?>
+<p:sld xmlns:a="http://schemas.openxmlformats.org/drawingml/2006/main" xmlns:r="http://schemas.openxmlformats.org/officeDocument/2006/relationships" xmlns:p="http://schemas.openxmlformats.org/presentationml/2006/main">
+  <p:cSld>
+    <p:spTree>
+      <p:nvGrpSpPr>
+        <p:cNvPr id="1" name=""/>
+        <p:cNvGrpSpPr/>
+        <p:nvPr/>
+      </p:nvGrpSpPr>
+      <p:grpSpPr>
+        <a:xfrm>
+          <a:off x="0" y="0"/>
+          <a:ext cx="0" cy="0"/>
+          <a:chOff x="0" y="0"/>
+          <a:chExt cx="0" cy="0"/>
+        </a:xfrm>
+      </p:grpSpPr>
+      <p:sp>
+        <p:nvSpPr>
+          <p:cNvPr id="4" name="Title 3"/>
+          <p:cNvSpPr>
+            <a:spLocks noGrp="1"/>
+          </p:cNvSpPr>
+          <p:nvPr>
+            <p:ph type="title"/>
+          </p:nvPr>
+        </p:nvSpPr>
+        <p:spPr/>
+        <p:txBody>
+          <a:bodyPr/>
+          <a:lstStyle/>
+          <a:p>
+            <a:r>
+              <a:rPr lang="en-US" dirty="0" smtClean="0"/>
+              <a:t>Is Kickstarter worth my time?</a:t>
+            </a:r>
+            <a:endParaRPr lang="en-US" dirty="0"/>
+          </a:p>
+        </p:txBody>
+      </p:sp>
+      <p:sp>
+        <p:nvSpPr>
+          <p:cNvPr id="5" name="Text Placeholder 4"/>
+          <p:cNvSpPr>
+            <a:spLocks noGrp="1"/>
+          </p:cNvSpPr>
+          <p:nvPr>
+            <p:ph type="body" idx="1"/>
+          </p:nvPr>
+        </p:nvSpPr>
+        <p:spPr/>
+        <p:txBody>
+          <a:bodyPr/>
+          <a:lstStyle/>
+          <a:p>
+            <a:r>
+              <a:rPr lang="en-US" dirty="0" smtClean="0"/>
+              <a:t>Well, let’s see…</a:t>
+            </a:r>
+            <a:endParaRPr lang="en-US" dirty="0"/>
+          </a:p>
+        </p:txBody>
+      </p:sp>
+    </p:spTree>
+    <p:extLst>
+      <p:ext uri="{BB962C8B-B14F-4D97-AF65-F5344CB8AC3E}">
+        <p14:creationId xmlns:p14="http://schemas.microsoft.com/office/powerpoint/2010/main" val="3663783951"/>
+      </p:ext>
+    </p:extLst>
+  </p:cSld>
+  <p:clrMapOvr>
+    <a:masterClrMapping/>
+  </p:clrMapOvr>
+</p:sld>
+</file>
+
+<file path=ppt/slides/slide6.xml><?xml version="1.0" encoding="utf-8"?>
+<p:sld xmlns:a="http://schemas.openxmlformats.org/drawingml/2006/main" xmlns:r="http://schemas.openxmlformats.org/officeDocument/2006/relationships" xmlns:p="http://schemas.openxmlformats.org/presentationml/2006/main">
+  <p:cSld>
+    <p:spTree>
+      <p:nvGrpSpPr>
+        <p:cNvPr id="1" name=""/>
+        <p:cNvGrpSpPr/>
+        <p:nvPr/>
+      </p:nvGrpSpPr>
+      <p:grpSpPr>
+        <a:xfrm>
+          <a:off x="0" y="0"/>
+          <a:ext cx="0" cy="0"/>
+          <a:chOff x="0" y="0"/>
+          <a:chExt cx="0" cy="0"/>
+        </a:xfrm>
+      </p:grpSpPr>
+      <p:sp>
+        <p:nvSpPr>
+          <p:cNvPr id="2" name="Title 1"/>
+          <p:cNvSpPr>
+            <a:spLocks noGrp="1"/>
+          </p:cNvSpPr>
+          <p:nvPr>
+            <p:ph type="title"/>
+          </p:nvPr>
+        </p:nvSpPr>
+        <p:spPr/>
+        <p:txBody>
+          <a:bodyPr/>
+          <a:lstStyle/>
+          <a:p>
+            <a:r>
+              <a:rPr lang="en-US" dirty="0" smtClean="0"/>
+              <a:t>You’ve got more than a 50/50 shot</a:t>
+            </a:r>
+            <a:endParaRPr lang="en-US" dirty="0"/>
+          </a:p>
+        </p:txBody>
+      </p:sp>
+      <p:graphicFrame>
+        <p:nvGraphicFramePr>
+          <p:cNvPr id="9" name="Content Placeholder 8"/>
+          <p:cNvGraphicFramePr>
+            <a:graphicFrameLocks noGrp="1"/>
+          </p:cNvGraphicFramePr>
+          <p:nvPr>
+            <p:ph idx="1"/>
+            <p:extLst>
+              <p:ext uri="{D42A27DB-BD31-4B8C-83A1-F6EECF244321}">
+                <p14:modId xmlns:p14="http://schemas.microsoft.com/office/powerpoint/2010/main" val="3462162485"/>
+              </p:ext>
+            </p:extLst>
+          </p:nvPr>
+        </p:nvGraphicFramePr>
+        <p:xfrm>
+          <a:off x="819150" y="2222500"/>
+          <a:ext cx="10553700" cy="3636963"/>
+        </p:xfrm>
+        <a:graphic>
+          <a:graphicData uri="http://schemas.openxmlformats.org/drawingml/2006/chart">
+            <c:chart xmlns:c="http://schemas.openxmlformats.org/drawingml/2006/chart" xmlns:r="http://schemas.openxmlformats.org/officeDocument/2006/relationships" r:id="rId3"/>
+          </a:graphicData>
+        </a:graphic>
+      </p:graphicFrame>
+    </p:spTree>
+    <p:extLst>
+      <p:ext uri="{BB962C8B-B14F-4D97-AF65-F5344CB8AC3E}">
+        <p14:creationId xmlns:p14="http://schemas.microsoft.com/office/powerpoint/2010/main" val="1790692051"/>
+      </p:ext>
+    </p:extLst>
+  </p:cSld>
+  <p:clrMapOvr>
+    <a:masterClrMapping/>
+  </p:clrMapOvr>
+</p:sld>
+</file>
+
+<file path=ppt/slides/slide7.xml><?xml version="1.0" encoding="utf-8"?>
+<p:sld xmlns:a="http://schemas.openxmlformats.org/drawingml/2006/main" xmlns:r="http://schemas.openxmlformats.org/officeDocument/2006/relationships" xmlns:p="http://schemas.openxmlformats.org/presentationml/2006/main">
+  <p:cSld>
+    <p:spTree>
+      <p:nvGrpSpPr>
+        <p:cNvPr id="1" name=""/>
+        <p:cNvGrpSpPr/>
+        <p:nvPr/>
+      </p:nvGrpSpPr>
+      <p:grpSpPr>
+        <a:xfrm>
+          <a:off x="0" y="0"/>
+          <a:ext cx="0" cy="0"/>
+          <a:chOff x="0" y="0"/>
+          <a:chExt cx="0" cy="0"/>
+        </a:xfrm>
+      </p:grpSpPr>
+      <p:sp>
+        <p:nvSpPr>
+          <p:cNvPr id="2" name="Title 1"/>
+          <p:cNvSpPr>
+            <a:spLocks noGrp="1"/>
+          </p:cNvSpPr>
+          <p:nvPr>
+            <p:ph type="title"/>
+          </p:nvPr>
+        </p:nvSpPr>
+        <p:spPr/>
+        <p:txBody>
+          <a:bodyPr/>
+          <a:lstStyle/>
+          <a:p>
+            <a:r>
+              <a:rPr lang="en-US" dirty="0" smtClean="0"/>
+              <a:t>On average, success = $6k raised</a:t>
+            </a:r>
+            <a:endParaRPr lang="en-US" dirty="0"/>
+          </a:p>
+        </p:txBody>
+      </p:sp>
+      <p:sp>
+        <p:nvSpPr>
+          <p:cNvPr id="3" name="Content Placeholder 2"/>
+          <p:cNvSpPr>
+            <a:spLocks noGrp="1"/>
+          </p:cNvSpPr>
+          <p:nvPr>
+            <p:ph idx="1"/>
+          </p:nvPr>
+        </p:nvSpPr>
+        <p:spPr/>
+        <p:txBody>
+          <a:bodyPr/>
+          <a:lstStyle/>
+          <a:p>
+            <a:pPr marL="0" indent="0">
+              <a:buNone/>
+            </a:pPr>
+            <a:endParaRPr lang="en-US" dirty="0">
+              <a:solidFill>
+                <a:srgbClr val="FF0000"/>
+              </a:solidFill>
+            </a:endParaRPr>
+          </a:p>
+          <a:p>
+            <a:pPr marL="0" indent="0">
+              <a:buNone/>
+            </a:pPr>
+            <a:r>
+              <a:rPr lang="en-US" dirty="0" smtClean="0">
+                <a:solidFill>
+                  <a:srgbClr val="FF0000"/>
+                </a:solidFill>
+              </a:rPr>
+              <a:t>Insert </a:t>
+            </a:r>
+            <a:r>
+              <a:rPr lang="en-US" dirty="0">
+                <a:solidFill>
+                  <a:srgbClr val="FF0000"/>
+                </a:solidFill>
+              </a:rPr>
+              <a:t>plot of Successful </a:t>
+            </a:r>
+            <a:r>
+              <a:rPr lang="en-US" dirty="0" err="1">
+                <a:solidFill>
+                  <a:srgbClr val="FF0000"/>
+                </a:solidFill>
+              </a:rPr>
+              <a:t>Kickstarters</a:t>
+            </a:r>
+            <a:r>
+              <a:rPr lang="en-US" dirty="0">
+                <a:solidFill>
+                  <a:srgbClr val="FF0000"/>
+                </a:solidFill>
+              </a:rPr>
+              <a:t>- Mean Goal by category</a:t>
+            </a:r>
+          </a:p>
+          <a:p>
+            <a:pPr marL="0" indent="0">
+              <a:buNone/>
+            </a:pPr>
+            <a:endParaRPr lang="en-US" dirty="0"/>
+          </a:p>
+          <a:p>
+            <a:pPr marL="0" indent="0" fontAlgn="base">
+              <a:buNone/>
+            </a:pPr>
+            <a:endParaRPr lang="en-US" dirty="0" smtClean="0"/>
+          </a:p>
+          <a:p>
+            <a:endParaRPr lang="en-US" dirty="0"/>
+          </a:p>
+        </p:txBody>
+      </p:sp>
+    </p:spTree>
+    <p:extLst>
+      <p:ext uri="{BB962C8B-B14F-4D97-AF65-F5344CB8AC3E}">
+        <p14:creationId xmlns:p14="http://schemas.microsoft.com/office/powerpoint/2010/main" val="3339149536"/>
+      </p:ext>
+    </p:extLst>
+  </p:cSld>
+  <p:clrMapOvr>
+    <a:masterClrMapping/>
+  </p:clrMapOvr>
+</p:sld>
+</file>
+
+<file path=ppt/slides/slide8.xml><?xml version="1.0" encoding="utf-8"?>
+<p:sld xmlns:a="http://schemas.openxmlformats.org/drawingml/2006/main" xmlns:r="http://schemas.openxmlformats.org/officeDocument/2006/relationships" xmlns:p="http://schemas.openxmlformats.org/presentationml/2006/main">
+  <p:cSld>
+    <p:spTree>
+      <p:nvGrpSpPr>
+        <p:cNvPr id="1" name=""/>
+        <p:cNvGrpSpPr/>
+        <p:nvPr/>
+      </p:nvGrpSpPr>
+      <p:grpSpPr>
+        <a:xfrm>
+          <a:off x="0" y="0"/>
+          <a:ext cx="0" cy="0"/>
+          <a:chOff x="0" y="0"/>
+          <a:chExt cx="0" cy="0"/>
+        </a:xfrm>
+      </p:grpSpPr>
+      <p:sp>
+        <p:nvSpPr>
+          <p:cNvPr id="2" name="Title 1"/>
+          <p:cNvSpPr>
+            <a:spLocks noGrp="1"/>
+          </p:cNvSpPr>
+          <p:nvPr>
+            <p:ph type="title"/>
+          </p:nvPr>
+        </p:nvSpPr>
+        <p:spPr/>
+        <p:txBody>
+          <a:bodyPr/>
+          <a:lstStyle/>
+          <a:p>
+            <a:r>
+              <a:rPr lang="en-US" dirty="0" smtClean="0"/>
+              <a:t>Let’s talk #goals</a:t>
+            </a:r>
+            <a:endParaRPr lang="en-US" dirty="0"/>
+          </a:p>
+        </p:txBody>
+      </p:sp>
+      <p:sp>
+        <p:nvSpPr>
+          <p:cNvPr id="3" name="Content Placeholder 2"/>
+          <p:cNvSpPr>
+            <a:spLocks noGrp="1"/>
+          </p:cNvSpPr>
+          <p:nvPr>
+            <p:ph idx="1"/>
+          </p:nvPr>
+        </p:nvSpPr>
+        <p:spPr/>
+        <p:txBody>
+          <a:bodyPr/>
+          <a:lstStyle/>
+          <a:p>
+            <a:pPr lvl="1" fontAlgn="base"/>
+            <a:r>
+              <a:rPr lang="en-US" dirty="0" smtClean="0">
+                <a:solidFill>
+                  <a:srgbClr val="FF0000"/>
+                </a:solidFill>
+              </a:rPr>
+              <a:t>Insert </a:t>
+            </a:r>
+            <a:r>
+              <a:rPr lang="en-US" dirty="0">
+                <a:solidFill>
+                  <a:srgbClr val="FF0000"/>
+                </a:solidFill>
+              </a:rPr>
+              <a:t>plot comparing average goal of successful KS vs failed KS - nested bar would be ideal</a:t>
+            </a:r>
+          </a:p>
+          <a:p>
+            <a:endParaRPr lang="en-US" dirty="0"/>
+          </a:p>
+        </p:txBody>
+      </p:sp>
+    </p:spTree>
+    <p:extLst>
+      <p:ext uri="{BB962C8B-B14F-4D97-AF65-F5344CB8AC3E}">
+        <p14:creationId xmlns:p14="http://schemas.microsoft.com/office/powerpoint/2010/main" val="811058815"/>
+      </p:ext>
+    </p:extLst>
+  </p:cSld>
+  <p:clrMapOvr>
+    <a:masterClrMapping/>
+  </p:clrMapOvr>
+</p:sld>
+</file>
+
+<file path=ppt/slides/slide9.xml><?xml version="1.0" encoding="utf-8"?>
+<p:sld xmlns:a="http://schemas.openxmlformats.org/drawingml/2006/main" xmlns:r="http://schemas.openxmlformats.org/officeDocument/2006/relationships" xmlns:p="http://schemas.openxmlformats.org/presentationml/2006/main">
+  <p:cSld>
+    <p:spTree>
+      <p:nvGrpSpPr>
+        <p:cNvPr id="1" name=""/>
+        <p:cNvGrpSpPr/>
+        <p:nvPr/>
+      </p:nvGrpSpPr>
+      <p:grpSpPr>
+        <a:xfrm>
+          <a:off x="0" y="0"/>
+          <a:ext cx="0" cy="0"/>
+          <a:chOff x="0" y="0"/>
+          <a:chExt cx="0" cy="0"/>
+        </a:xfrm>
+      </p:grpSpPr>
+      <p:sp>
+        <p:nvSpPr>
+          <p:cNvPr id="2" name="Title 1"/>
+          <p:cNvSpPr>
+            <a:spLocks noGrp="1"/>
+          </p:cNvSpPr>
+          <p:nvPr>
+            <p:ph type="title"/>
+          </p:nvPr>
+        </p:nvSpPr>
+        <p:spPr/>
+        <p:txBody>
+          <a:bodyPr/>
+          <a:lstStyle/>
+          <a:p>
+            <a:r>
+              <a:rPr lang="en-US" dirty="0" smtClean="0"/>
+              <a:t>$ Pledged / # Backers = Tipping Point</a:t>
+            </a:r>
+            <a:endParaRPr lang="en-US" dirty="0"/>
+          </a:p>
+        </p:txBody>
+      </p:sp>
+      <p:sp>
+        <p:nvSpPr>
+          <p:cNvPr id="3" name="Content Placeholder 2"/>
+          <p:cNvSpPr>
+            <a:spLocks noGrp="1"/>
+          </p:cNvSpPr>
+          <p:nvPr>
+            <p:ph idx="1"/>
+          </p:nvPr>
+        </p:nvSpPr>
+        <p:spPr/>
+        <p:txBody>
+          <a:bodyPr/>
+          <a:lstStyle/>
+          <a:p>
+            <a:pPr lvl="1" fontAlgn="base"/>
+            <a:r>
+              <a:rPr lang="en-US" dirty="0" smtClean="0">
+                <a:solidFill>
+                  <a:srgbClr val="FF0000"/>
+                </a:solidFill>
+              </a:rPr>
+              <a:t>Insert </a:t>
+            </a:r>
+            <a:r>
+              <a:rPr lang="en-US" dirty="0">
+                <a:solidFill>
+                  <a:srgbClr val="FF0000"/>
+                </a:solidFill>
+              </a:rPr>
+              <a:t>plot of this number across different categories</a:t>
+            </a:r>
+          </a:p>
+          <a:p>
+            <a:endParaRPr lang="en-US" dirty="0"/>
+          </a:p>
+        </p:txBody>
+      </p:sp>
+    </p:spTree>
+    <p:extLst>
+      <p:ext uri="{BB962C8B-B14F-4D97-AF65-F5344CB8AC3E}">
+        <p14:creationId xmlns:p14="http://schemas.microsoft.com/office/powerpoint/2010/main" val="918929081"/>
       </p:ext>
     </p:extLst>
   </p:cSld>

</xml_diff>